<commit_message>
changes to presentation and a few code changes
</commit_message>
<xml_diff>
--- a/Samples/timwingfield/Getting-Started-With-MVC/Getting Started with MVC with shorn.pptx
+++ b/Samples/timwingfield/Getting-Started-With-MVC/Getting Started with MVC with shorn.pptx
@@ -219,7 +219,7 @@
             <a:fld id="{B8B43353-CC08-4841-A32F-CA9CB26E48DD}" type="datetimeFigureOut">
               <a:rPr lang="en-US" smtClean="0"/>
               <a:pPr/>
-              <a:t>10/9/2009</a:t>
+              <a:t>10/15/2009</a:t>
             </a:fld>
             <a:endParaRPr lang="en-US"/>
           </a:p>
@@ -656,69 +656,37 @@
           <a:p>
             <a:r>
               <a:rPr lang="en-US" dirty="0" smtClean="0"/>
-              <a:t>New offering from Microsoft</a:t>
-            </a:r>
+              <a:t>TIM</a:t>
+            </a:r>
+          </a:p>
+          <a:p>
+            <a:endParaRPr lang="en-US" dirty="0" smtClean="0"/>
           </a:p>
           <a:p>
             <a:r>
               <a:rPr lang="en-US" dirty="0" smtClean="0"/>
-              <a:t>Shared source project</a:t>
+              <a:t>PHP </a:t>
+            </a:r>
+            <a:r>
+              <a:rPr lang="en-US" dirty="0" smtClean="0"/>
+              <a:t>lists 35 different MVC implementations</a:t>
             </a:r>
             <a:r>
               <a:rPr lang="en-US" baseline="0" dirty="0" smtClean="0"/>
-              <a:t> (similar to the AJAX Toolkit, which is the first I remember)</a:t>
+              <a:t> on Wikipedia</a:t>
             </a:r>
             <a:endParaRPr lang="en-US" dirty="0" smtClean="0"/>
           </a:p>
           <a:p>
             <a:r>
               <a:rPr lang="en-US" dirty="0" smtClean="0"/>
-              <a:t>Expand on not a replacement to </a:t>
-            </a:r>
-            <a:r>
-              <a:rPr lang="en-US" dirty="0" err="1" smtClean="0"/>
-              <a:t>WebForms</a:t>
-            </a:r>
-            <a:endParaRPr lang="en-US" dirty="0" smtClean="0"/>
-          </a:p>
-          <a:p>
+              <a:t>Up</a:t>
+            </a:r>
             <a:r>
               <a:rPr lang="en-US" baseline="0" dirty="0" smtClean="0"/>
-              <a:t> - Alternative to </a:t>
-            </a:r>
-            <a:r>
-              <a:rPr lang="en-US" baseline="0" dirty="0" err="1" smtClean="0"/>
-              <a:t>WebForms</a:t>
-            </a:r>
-            <a:endParaRPr lang="en-US" baseline="0" dirty="0" smtClean="0"/>
-          </a:p>
-          <a:p>
-            <a:r>
-              <a:rPr lang="en-US" baseline="0" dirty="0" smtClean="0"/>
-              <a:t> - </a:t>
-            </a:r>
-            <a:r>
-              <a:rPr lang="en-US" baseline="0" dirty="0" err="1" smtClean="0"/>
-              <a:t>WebForms</a:t>
-            </a:r>
-            <a:r>
-              <a:rPr lang="en-US" baseline="0" dirty="0" smtClean="0"/>
-              <a:t> not going away</a:t>
-            </a:r>
-          </a:p>
-          <a:p>
-            <a:r>
-              <a:rPr lang="en-US" baseline="0" dirty="0" smtClean="0"/>
-              <a:t> - Not </a:t>
-            </a:r>
-            <a:r>
-              <a:rPr lang="en-US" baseline="0" dirty="0" err="1" smtClean="0"/>
-              <a:t>WebForms</a:t>
-            </a:r>
-            <a:r>
-              <a:rPr lang="en-US" baseline="0" dirty="0" smtClean="0"/>
-              <a:t> 4.0</a:t>
-            </a:r>
+              <a:t> to 71 now</a:t>
+            </a:r>
+            <a:endParaRPr lang="en-US" dirty="0"/>
           </a:p>
         </p:txBody>
       </p:sp>
@@ -740,7 +708,7 @@
             <a:fld id="{F8007F4E-10F5-4104-9EF8-E98D370060A3}" type="slidenum">
               <a:rPr lang="en-US" smtClean="0"/>
               <a:pPr/>
-              <a:t>13</a:t>
+              <a:t>10</a:t>
             </a:fld>
             <a:endParaRPr lang="en-US"/>
           </a:p>
@@ -802,24 +770,22 @@
           <a:p>
             <a:r>
               <a:rPr lang="en-US" dirty="0" smtClean="0"/>
-              <a:t>Obligatory 3 circle diagram</a:t>
-            </a:r>
+              <a:t>TIM</a:t>
+            </a:r>
+          </a:p>
+          <a:p>
+            <a:endParaRPr lang="en-US" dirty="0" smtClean="0"/>
           </a:p>
           <a:p>
             <a:r>
               <a:rPr lang="en-US" dirty="0" smtClean="0"/>
-              <a:t>Smalltalk</a:t>
-            </a:r>
-            <a:r>
-              <a:rPr lang="en-US" baseline="0" dirty="0" smtClean="0"/>
-              <a:t> 1979</a:t>
-            </a:r>
-          </a:p>
-          <a:p>
-            <a:r>
-              <a:rPr lang="en-US" baseline="0" dirty="0" smtClean="0"/>
-              <a:t>Separation of concerns</a:t>
-            </a:r>
+              <a:t>Spring </a:t>
+            </a:r>
+            <a:r>
+              <a:rPr lang="en-US" dirty="0" smtClean="0"/>
+              <a:t>MVC, specifically</a:t>
+            </a:r>
+            <a:endParaRPr lang="en-US" dirty="0"/>
           </a:p>
         </p:txBody>
       </p:sp>
@@ -841,7 +807,7 @@
             <a:fld id="{F8007F4E-10F5-4104-9EF8-E98D370060A3}" type="slidenum">
               <a:rPr lang="en-US" smtClean="0"/>
               <a:pPr/>
-              <a:t>14</a:t>
+              <a:t>11</a:t>
             </a:fld>
             <a:endParaRPr lang="en-US"/>
           </a:p>
@@ -901,39 +867,9 @@
           </a:bodyPr>
           <a:lstStyle/>
           <a:p>
-            <a:pPr marL="228600" indent="-228600">
-              <a:buAutoNum type="arabicPeriod"/>
-            </a:pPr>
-            <a:r>
-              <a:rPr lang="en-US" baseline="0" dirty="0" smtClean="0"/>
-              <a:t>Controller runs the show</a:t>
-            </a:r>
-          </a:p>
-          <a:p>
-            <a:pPr marL="228600" indent="-228600">
-              <a:buAutoNum type="arabicPeriod"/>
-            </a:pPr>
-            <a:r>
-              <a:rPr lang="en-US" baseline="0" dirty="0" smtClean="0"/>
-              <a:t>It handles the request</a:t>
-            </a:r>
-          </a:p>
-          <a:p>
-            <a:pPr marL="228600" indent="-228600">
-              <a:buAutoNum type="arabicPeriod"/>
-            </a:pPr>
-            <a:r>
-              <a:rPr lang="en-US" baseline="0" dirty="0" smtClean="0"/>
-              <a:t>Determines view</a:t>
-            </a:r>
-          </a:p>
-          <a:p>
-            <a:pPr marL="228600" indent="-228600">
-              <a:buAutoNum type="arabicPeriod"/>
-            </a:pPr>
-            <a:r>
-              <a:rPr lang="en-US" baseline="0" dirty="0" smtClean="0"/>
-              <a:t>Determines data to load the view</a:t>
+            <a:r>
+              <a:rPr lang="en-US" dirty="0" smtClean="0"/>
+              <a:t>TIM</a:t>
             </a:r>
             <a:endParaRPr lang="en-US" dirty="0"/>
           </a:p>
@@ -957,7 +893,7 @@
             <a:fld id="{F8007F4E-10F5-4104-9EF8-E98D370060A3}" type="slidenum">
               <a:rPr lang="en-US" smtClean="0"/>
               <a:pPr/>
-              <a:t>15</a:t>
+              <a:t>12</a:t>
             </a:fld>
             <a:endParaRPr lang="en-US"/>
           </a:p>
@@ -1017,30 +953,83 @@
           </a:bodyPr>
           <a:lstStyle/>
           <a:p>
-            <a:pPr marL="228600" indent="-228600">
-              <a:buAutoNum type="arabicPeriod"/>
-            </a:pPr>
+            <a:r>
+              <a:rPr lang="en-US" dirty="0" smtClean="0"/>
+              <a:t>STEVE</a:t>
+            </a:r>
+          </a:p>
+          <a:p>
+            <a:endParaRPr lang="en-US" dirty="0" smtClean="0"/>
+          </a:p>
+          <a:p>
+            <a:r>
+              <a:rPr lang="en-US" dirty="0" smtClean="0"/>
+              <a:t>New </a:t>
+            </a:r>
+            <a:r>
+              <a:rPr lang="en-US" dirty="0" smtClean="0"/>
+              <a:t>offering from Microsoft</a:t>
+            </a:r>
+          </a:p>
+          <a:p>
+            <a:r>
+              <a:rPr lang="en-US" dirty="0" smtClean="0"/>
+              <a:t>Shared source project</a:t>
+            </a:r>
             <a:r>
               <a:rPr lang="en-US" baseline="0" dirty="0" smtClean="0"/>
-              <a:t>The view is only the presentation to the user</a:t>
-            </a:r>
-          </a:p>
-          <a:p>
-            <a:pPr marL="228600" indent="-228600">
-              <a:buAutoNum type="arabicPeriod"/>
-            </a:pPr>
+              <a:t> (similar to the AJAX Toolkit, which is the first I remember)</a:t>
+            </a:r>
+            <a:endParaRPr lang="en-US" dirty="0" smtClean="0"/>
+          </a:p>
+          <a:p>
+            <a:r>
+              <a:rPr lang="en-US" dirty="0" smtClean="0"/>
+              <a:t>Expand on not a replacement to </a:t>
+            </a:r>
+            <a:r>
+              <a:rPr lang="en-US" dirty="0" err="1" smtClean="0"/>
+              <a:t>WebForms</a:t>
+            </a:r>
+            <a:endParaRPr lang="en-US" dirty="0" smtClean="0"/>
+          </a:p>
+          <a:p>
             <a:r>
               <a:rPr lang="en-US" baseline="0" dirty="0" smtClean="0"/>
-              <a:t>Any logic should only be presentation logic (check boxes checked, dropdowns set, etc)</a:t>
-            </a:r>
-          </a:p>
-          <a:p>
-            <a:pPr marL="228600" indent="-228600">
-              <a:buAutoNum type="arabicPeriod"/>
-            </a:pPr>
+              <a:t> - Alternative to </a:t>
+            </a:r>
+            <a:r>
+              <a:rPr lang="en-US" baseline="0" dirty="0" err="1" smtClean="0"/>
+              <a:t>WebForms</a:t>
+            </a:r>
+            <a:endParaRPr lang="en-US" baseline="0" dirty="0" smtClean="0"/>
+          </a:p>
+          <a:p>
             <a:r>
               <a:rPr lang="en-US" baseline="0" dirty="0" smtClean="0"/>
-              <a:t>asp.net version, view can be strongly typed to the model</a:t>
+              <a:t> - </a:t>
+            </a:r>
+            <a:r>
+              <a:rPr lang="en-US" baseline="0" dirty="0" err="1" smtClean="0"/>
+              <a:t>WebForms</a:t>
+            </a:r>
+            <a:r>
+              <a:rPr lang="en-US" baseline="0" dirty="0" smtClean="0"/>
+              <a:t> not going away</a:t>
+            </a:r>
+          </a:p>
+          <a:p>
+            <a:r>
+              <a:rPr lang="en-US" baseline="0" dirty="0" smtClean="0"/>
+              <a:t> - Not </a:t>
+            </a:r>
+            <a:r>
+              <a:rPr lang="en-US" baseline="0" dirty="0" err="1" smtClean="0"/>
+              <a:t>WebForms</a:t>
+            </a:r>
+            <a:r>
+              <a:rPr lang="en-US" baseline="0" dirty="0" smtClean="0"/>
+              <a:t> 4.0</a:t>
             </a:r>
           </a:p>
         </p:txBody>
@@ -1063,7 +1052,7 @@
             <a:fld id="{F8007F4E-10F5-4104-9EF8-E98D370060A3}" type="slidenum">
               <a:rPr lang="en-US" smtClean="0"/>
               <a:pPr/>
-              <a:t>16</a:t>
+              <a:t>13</a:t>
             </a:fld>
             <a:endParaRPr lang="en-US"/>
           </a:p>
@@ -1123,47 +1112,39 @@
           </a:bodyPr>
           <a:lstStyle/>
           <a:p>
-            <a:pPr marL="228600" indent="-228600">
-              <a:buAutoNum type="arabicPeriod"/>
-            </a:pPr>
+            <a:r>
+              <a:rPr lang="en-US" dirty="0" smtClean="0"/>
+              <a:t>STEVE</a:t>
+            </a:r>
+          </a:p>
+          <a:p>
+            <a:endParaRPr lang="en-US" dirty="0" smtClean="0"/>
+          </a:p>
+          <a:p>
+            <a:r>
+              <a:rPr lang="en-US" dirty="0" smtClean="0"/>
+              <a:t>Obligatory </a:t>
+            </a:r>
+            <a:r>
+              <a:rPr lang="en-US" dirty="0" smtClean="0"/>
+              <a:t>3 circle diagram</a:t>
+            </a:r>
+          </a:p>
+          <a:p>
+            <a:r>
+              <a:rPr lang="en-US" dirty="0" smtClean="0"/>
+              <a:t>Smalltalk</a:t>
+            </a:r>
             <a:r>
               <a:rPr lang="en-US" baseline="0" dirty="0" smtClean="0"/>
-              <a:t>Model returns information as requested, doesn’t know to what view or what controller has called</a:t>
-            </a:r>
-          </a:p>
-          <a:p>
-            <a:pPr marL="228600" indent="-228600">
-              <a:buAutoNum type="arabicPeriod"/>
-            </a:pPr>
+              <a:t> 1979</a:t>
+            </a:r>
+          </a:p>
+          <a:p>
             <a:r>
               <a:rPr lang="en-US" baseline="0" dirty="0" smtClean="0"/>
-              <a:t>Model everything that’s not view and controller – business logic, data, not just the db</a:t>
-            </a:r>
-          </a:p>
-          <a:p>
-            <a:pPr marL="228600" indent="-228600">
-              <a:buAutoNum type="arabicPeriod"/>
-            </a:pPr>
-            <a:endParaRPr lang="en-US" baseline="0" dirty="0" smtClean="0"/>
-          </a:p>
-          <a:p>
-            <a:pPr marL="228600" indent="-228600">
-              <a:buNone/>
-            </a:pPr>
-            <a:r>
-              <a:rPr lang="en-US" baseline="0" dirty="0" smtClean="0"/>
-              <a:t>Speaking point:</a:t>
-            </a:r>
-          </a:p>
-          <a:p>
-            <a:pPr marL="228600" indent="-228600">
-              <a:buNone/>
-            </a:pPr>
-            <a:r>
-              <a:rPr lang="en-US" baseline="0" dirty="0" smtClean="0"/>
-              <a:t>You’re thinking, “OK, great. So what? Why now?”</a:t>
-            </a:r>
-            <a:endParaRPr lang="en-US" dirty="0"/>
+              <a:t>Separation of concerns</a:t>
+            </a:r>
           </a:p>
         </p:txBody>
       </p:sp>
@@ -1185,7 +1166,7 @@
             <a:fld id="{F8007F4E-10F5-4104-9EF8-E98D370060A3}" type="slidenum">
               <a:rPr lang="en-US" smtClean="0"/>
               <a:pPr/>
-              <a:t>17</a:t>
+              <a:t>14</a:t>
             </a:fld>
             <a:endParaRPr lang="en-US"/>
           </a:p>
@@ -1245,22 +1226,19 @@
           </a:bodyPr>
           <a:lstStyle/>
           <a:p>
-            <a:r>
-              <a:rPr lang="en-US" dirty="0" smtClean="0"/>
-              <a:t>Back</a:t>
-            </a:r>
+            <a:pPr marL="228600" indent="-228600">
+              <a:buNone/>
+            </a:pPr>
             <a:r>
               <a:rPr lang="en-US" baseline="0" dirty="0" smtClean="0"/>
-              <a:t> to </a:t>
-            </a:r>
-            <a:r>
-              <a:rPr lang="en-US" baseline="0" dirty="0" err="1" smtClean="0"/>
-              <a:t>Requset</a:t>
-            </a:r>
-            <a:r>
-              <a:rPr lang="en-US" baseline="0" dirty="0" smtClean="0"/>
-              <a:t> and Response</a:t>
-            </a:r>
+              <a:t>TIM</a:t>
+            </a:r>
+          </a:p>
+          <a:p>
+            <a:pPr marL="228600" indent="-228600">
+              <a:buNone/>
+            </a:pPr>
+            <a:endParaRPr lang="en-US" baseline="0" dirty="0" smtClean="0"/>
           </a:p>
           <a:p>
             <a:pPr marL="228600" indent="-228600">
@@ -1268,7 +1246,7 @@
             </a:pPr>
             <a:r>
               <a:rPr lang="en-US" baseline="0" dirty="0" smtClean="0"/>
-              <a:t>Request comes in</a:t>
+              <a:t>Controller runs the show</a:t>
             </a:r>
           </a:p>
           <a:p>
@@ -1277,7 +1255,11 @@
             </a:pPr>
             <a:r>
               <a:rPr lang="en-US" baseline="0" dirty="0" smtClean="0"/>
-              <a:t>Controller interprets the request and decides what to do</a:t>
+              <a:t>It </a:t>
+            </a:r>
+            <a:r>
+              <a:rPr lang="en-US" baseline="0" dirty="0" smtClean="0"/>
+              <a:t>handles the request</a:t>
             </a:r>
           </a:p>
           <a:p>
@@ -1286,7 +1268,7 @@
             </a:pPr>
             <a:r>
               <a:rPr lang="en-US" baseline="0" dirty="0" smtClean="0"/>
-              <a:t>Application does something cool</a:t>
+              <a:t>Determines view</a:t>
             </a:r>
           </a:p>
           <a:p>
@@ -1295,41 +1277,9 @@
             </a:pPr>
             <a:r>
               <a:rPr lang="en-US" baseline="0" dirty="0" smtClean="0"/>
-              <a:t>Response is sent back to the Internets</a:t>
-            </a:r>
-          </a:p>
-          <a:p>
-            <a:pPr marL="228600" indent="-228600">
-              <a:buAutoNum type="arabicPeriod"/>
-            </a:pPr>
-            <a:endParaRPr lang="en-US" baseline="0" dirty="0" smtClean="0"/>
-          </a:p>
-          <a:p>
-            <a:pPr marL="228600" indent="-228600">
-              <a:buNone/>
-            </a:pPr>
-            <a:r>
-              <a:rPr lang="en-US" baseline="0" dirty="0" smtClean="0"/>
-              <a:t>No Postback</a:t>
-            </a:r>
-          </a:p>
-          <a:p>
-            <a:pPr marL="228600" indent="-228600">
-              <a:buNone/>
-            </a:pPr>
-            <a:r>
-              <a:rPr lang="en-US" baseline="0" dirty="0" smtClean="0"/>
-              <a:t>Page lifecycle still happens (look at trace)</a:t>
-            </a:r>
-          </a:p>
-          <a:p>
-            <a:pPr marL="228600" indent="-228600">
-              <a:buNone/>
-            </a:pPr>
-            <a:r>
-              <a:rPr lang="en-US" baseline="0" dirty="0" smtClean="0"/>
-              <a:t>Still based on asp.net</a:t>
-            </a:r>
+              <a:t>Determines data to load the view</a:t>
+            </a:r>
+            <a:endParaRPr lang="en-US" dirty="0"/>
           </a:p>
         </p:txBody>
       </p:sp>
@@ -1351,7 +1301,7 @@
             <a:fld id="{F8007F4E-10F5-4104-9EF8-E98D370060A3}" type="slidenum">
               <a:rPr lang="en-US" smtClean="0"/>
               <a:pPr/>
-              <a:t>18</a:t>
+              <a:t>15</a:t>
             </a:fld>
             <a:endParaRPr lang="en-US"/>
           </a:p>
@@ -1415,71 +1365,46 @@
               <a:buNone/>
             </a:pPr>
             <a:r>
-              <a:rPr lang="en-US" dirty="0" smtClean="0"/>
-              <a:t>Encourage</a:t>
-            </a:r>
-            <a:r>
               <a:rPr lang="en-US" baseline="0" dirty="0" smtClean="0"/>
-              <a:t> use of OOP principles</a:t>
-            </a:r>
-          </a:p>
-          <a:p>
-            <a:pPr marL="685800" lvl="1" indent="-228600">
+              <a:t>TIM</a:t>
+            </a:r>
+          </a:p>
+          <a:p>
+            <a:pPr marL="228600" indent="-228600">
+              <a:buNone/>
+            </a:pPr>
+            <a:endParaRPr lang="en-US" baseline="0" dirty="0" smtClean="0"/>
+          </a:p>
+          <a:p>
+            <a:pPr marL="228600" indent="-228600">
               <a:buAutoNum type="arabicPeriod"/>
             </a:pPr>
             <a:r>
               <a:rPr lang="en-US" baseline="0" dirty="0" smtClean="0"/>
-              <a:t>Separation of Concerns</a:t>
-            </a:r>
-          </a:p>
-          <a:p>
-            <a:pPr marL="685800" lvl="1" indent="-228600">
+              <a:t>The </a:t>
+            </a:r>
+            <a:r>
+              <a:rPr lang="en-US" baseline="0" dirty="0" smtClean="0"/>
+              <a:t>view is only the presentation to the user</a:t>
+            </a:r>
+          </a:p>
+          <a:p>
+            <a:pPr marL="228600" indent="-228600">
               <a:buAutoNum type="arabicPeriod"/>
             </a:pPr>
             <a:r>
               <a:rPr lang="en-US" baseline="0" dirty="0" smtClean="0"/>
-              <a:t>Single </a:t>
-            </a:r>
-            <a:r>
-              <a:rPr lang="en-US" baseline="0" dirty="0" err="1" smtClean="0"/>
-              <a:t>Responsibilty</a:t>
-            </a:r>
-            <a:endParaRPr lang="en-US" baseline="0" dirty="0" smtClean="0"/>
-          </a:p>
-          <a:p>
-            <a:pPr marL="685800" lvl="1" indent="-228600">
+              <a:t>Any logic should only be presentation logic (check boxes checked, dropdowns set, etc)</a:t>
+            </a:r>
+          </a:p>
+          <a:p>
+            <a:pPr marL="228600" indent="-228600">
               <a:buAutoNum type="arabicPeriod"/>
             </a:pPr>
             <a:r>
               <a:rPr lang="en-US" baseline="0" dirty="0" smtClean="0"/>
-              <a:t>Dependencies are abstracted out to </a:t>
-            </a:r>
-            <a:r>
-              <a:rPr lang="en-US" baseline="0" dirty="0" err="1" smtClean="0"/>
-              <a:t>HttpContextBase</a:t>
-            </a:r>
-            <a:r>
-              <a:rPr lang="en-US" baseline="0" dirty="0" smtClean="0"/>
-              <a:t>, </a:t>
-            </a:r>
-            <a:r>
-              <a:rPr lang="en-US" baseline="0" dirty="0" err="1" smtClean="0"/>
-              <a:t>HttpRequestBase</a:t>
-            </a:r>
-            <a:r>
-              <a:rPr lang="en-US" baseline="0" dirty="0" smtClean="0"/>
-              <a:t>, etc</a:t>
-            </a:r>
-          </a:p>
-          <a:p>
-            <a:pPr marL="685800" lvl="1" indent="-228600">
-              <a:buAutoNum type="arabicPeriod"/>
-            </a:pPr>
-            <a:r>
-              <a:rPr lang="en-US" baseline="0" dirty="0" smtClean="0"/>
-              <a:t>All Http classes now easily mocked</a:t>
-            </a:r>
-            <a:endParaRPr lang="en-US" dirty="0"/>
+              <a:t>asp.net version, view can be strongly typed to the model</a:t>
+            </a:r>
           </a:p>
         </p:txBody>
       </p:sp>
@@ -1501,7 +1426,7 @@
             <a:fld id="{F8007F4E-10F5-4104-9EF8-E98D370060A3}" type="slidenum">
               <a:rPr lang="en-US" smtClean="0"/>
               <a:pPr/>
-              <a:t>19</a:t>
+              <a:t>16</a:t>
             </a:fld>
             <a:endParaRPr lang="en-US"/>
           </a:p>
@@ -1566,81 +1491,60 @@
             </a:pPr>
             <a:r>
               <a:rPr lang="en-US" baseline="0" dirty="0" smtClean="0"/>
-              <a:t>More control over your HTML</a:t>
+              <a:t>TIM</a:t>
             </a:r>
           </a:p>
           <a:p>
             <a:pPr marL="228600" indent="-228600">
               <a:buNone/>
             </a:pPr>
+            <a:endParaRPr lang="en-US" baseline="0" dirty="0" smtClean="0"/>
+          </a:p>
+          <a:p>
+            <a:pPr marL="228600" indent="-228600">
+              <a:buAutoNum type="arabicPeriod"/>
+            </a:pPr>
             <a:r>
               <a:rPr lang="en-US" baseline="0" dirty="0" smtClean="0"/>
-              <a:t>Bye </a:t>
-            </a:r>
-            <a:r>
-              <a:rPr lang="en-US" baseline="0" dirty="0" err="1" smtClean="0"/>
-              <a:t>bye</a:t>
+              <a:t>Model </a:t>
             </a:r>
             <a:r>
               <a:rPr lang="en-US" baseline="0" dirty="0" smtClean="0"/>
-              <a:t> naming container</a:t>
-            </a:r>
+              <a:t>returns information as requested, doesn’t know to what view or what controller has called</a:t>
+            </a:r>
+          </a:p>
+          <a:p>
+            <a:pPr marL="228600" indent="-228600">
+              <a:buAutoNum type="arabicPeriod"/>
+            </a:pPr>
+            <a:r>
+              <a:rPr lang="en-US" baseline="0" dirty="0" smtClean="0"/>
+              <a:t>Model everything that’s not view and controller – business logic, data, not just the db</a:t>
+            </a:r>
+          </a:p>
+          <a:p>
+            <a:pPr marL="228600" indent="-228600">
+              <a:buAutoNum type="arabicPeriod"/>
+            </a:pPr>
+            <a:endParaRPr lang="en-US" baseline="0" dirty="0" smtClean="0"/>
           </a:p>
           <a:p>
             <a:pPr marL="228600" indent="-228600">
               <a:buNone/>
             </a:pPr>
             <a:r>
-              <a:rPr lang="en-US" baseline="0" dirty="0" err="1" smtClean="0"/>
-              <a:t>Runat</a:t>
-            </a:r>
-            <a:r>
               <a:rPr lang="en-US" baseline="0" dirty="0" smtClean="0"/>
-              <a:t>=server no longer needed</a:t>
-            </a:r>
-            <a:endParaRPr lang="en-US" dirty="0" smtClean="0"/>
+              <a:t>Speaking point:</a:t>
+            </a:r>
           </a:p>
           <a:p>
             <a:pPr marL="228600" indent="-228600">
               <a:buNone/>
             </a:pPr>
             <a:r>
-              <a:rPr lang="en-US" dirty="0" smtClean="0"/>
-              <a:t>Separation of concerns, keep business logic out</a:t>
-            </a:r>
-            <a:r>
               <a:rPr lang="en-US" baseline="0" dirty="0" smtClean="0"/>
-              <a:t> of</a:t>
-            </a:r>
-            <a:r>
-              <a:rPr lang="en-US" dirty="0" smtClean="0"/>
-              <a:t> your presentation code</a:t>
-            </a:r>
-          </a:p>
-          <a:p>
-            <a:pPr marL="228600" indent="-228600">
-              <a:buNone/>
-            </a:pPr>
-            <a:r>
-              <a:rPr lang="en-US" dirty="0" smtClean="0"/>
-              <a:t>Use</a:t>
-            </a:r>
-            <a:r>
-              <a:rPr lang="en-US" baseline="0" dirty="0" smtClean="0"/>
-              <a:t> of CSS easier</a:t>
-            </a:r>
-          </a:p>
-          <a:p>
-            <a:pPr marL="228600" indent="-228600">
-              <a:buNone/>
-            </a:pPr>
-            <a:r>
-              <a:rPr lang="en-US" baseline="0" dirty="0" smtClean="0"/>
-              <a:t>Notice return of “Classic ASP” type code</a:t>
-            </a:r>
-            <a:endParaRPr lang="en-US" dirty="0" smtClean="0"/>
-          </a:p>
-          <a:p>
+              <a:t>You’re thinking, “OK, great. So what? Why now?”</a:t>
+            </a:r>
             <a:endParaRPr lang="en-US" dirty="0"/>
           </a:p>
         </p:txBody>
@@ -1663,7 +1567,7 @@
             <a:fld id="{F8007F4E-10F5-4104-9EF8-E98D370060A3}" type="slidenum">
               <a:rPr lang="en-US" smtClean="0"/>
               <a:pPr/>
-              <a:t>20</a:t>
+              <a:t>17</a:t>
             </a:fld>
             <a:endParaRPr lang="en-US"/>
           </a:p>
@@ -1724,53 +1628,103 @@
           <a:lstStyle/>
           <a:p>
             <a:r>
+              <a:rPr lang="en-US" dirty="0" smtClean="0"/>
+              <a:t>TIM</a:t>
+            </a:r>
+          </a:p>
+          <a:p>
+            <a:endParaRPr lang="en-US" dirty="0" smtClean="0"/>
+          </a:p>
+          <a:p>
+            <a:r>
+              <a:rPr lang="en-US" dirty="0" smtClean="0"/>
+              <a:t>Back</a:t>
+            </a:r>
+            <a:r>
               <a:rPr lang="en-US" baseline="0" dirty="0" smtClean="0"/>
-              <a:t>Routing</a:t>
-            </a:r>
-            <a:endParaRPr lang="en-US" dirty="0" smtClean="0"/>
-          </a:p>
-          <a:p>
-            <a:pPr lvl="1">
-              <a:buFont typeface="Arial" pitchFamily="34" charset="0"/>
-              <a:buChar char="•"/>
+              <a:t> </a:t>
+            </a:r>
+            <a:r>
+              <a:rPr lang="en-US" baseline="0" dirty="0" smtClean="0"/>
+              <a:t>to </a:t>
+            </a:r>
+            <a:r>
+              <a:rPr lang="en-US" baseline="0" dirty="0" err="1" smtClean="0"/>
+              <a:t>Requset</a:t>
+            </a:r>
+            <a:r>
+              <a:rPr lang="en-US" baseline="0" dirty="0" smtClean="0"/>
+              <a:t> and Response</a:t>
+            </a:r>
+          </a:p>
+          <a:p>
+            <a:pPr marL="228600" indent="-228600">
+              <a:buAutoNum type="arabicPeriod"/>
             </a:pPr>
             <a:r>
-              <a:rPr lang="en-US" dirty="0" smtClean="0"/>
-              <a:t>Maps incoming URLs to the correct Controllers</a:t>
-            </a:r>
-          </a:p>
-          <a:p>
-            <a:pPr lvl="1">
-              <a:buFont typeface="Arial" pitchFamily="34" charset="0"/>
-              <a:buChar char="•"/>
+              <a:rPr lang="en-US" baseline="0" dirty="0" smtClean="0"/>
+              <a:t>Request comes in</a:t>
+            </a:r>
+          </a:p>
+          <a:p>
+            <a:pPr marL="228600" indent="-228600">
+              <a:buAutoNum type="arabicPeriod"/>
             </a:pPr>
             <a:r>
-              <a:rPr lang="en-US" dirty="0" smtClean="0"/>
-              <a:t>Maps outgoing URLs so they can be called back</a:t>
-            </a:r>
-          </a:p>
-          <a:p>
-            <a:pPr lvl="1">
-              <a:buFont typeface="Arial" pitchFamily="34" charset="0"/>
-              <a:buChar char="•"/>
+              <a:rPr lang="en-US" baseline="0" dirty="0" smtClean="0"/>
+              <a:t>Controller interprets the request and decides what to do</a:t>
+            </a:r>
+          </a:p>
+          <a:p>
+            <a:pPr marL="228600" indent="-228600">
+              <a:buAutoNum type="arabicPeriod"/>
             </a:pPr>
             <a:r>
-              <a:rPr lang="en-US" dirty="0" smtClean="0"/>
-              <a:t>Originally part of </a:t>
-            </a:r>
-            <a:r>
-              <a:rPr lang="en-US" dirty="0" err="1" smtClean="0"/>
-              <a:t>mvc</a:t>
-            </a:r>
-            <a:r>
-              <a:rPr lang="en-US" dirty="0" smtClean="0"/>
-              <a:t> namespace, has</a:t>
-            </a:r>
-            <a:r>
               <a:rPr lang="en-US" baseline="0" dirty="0" smtClean="0"/>
-              <a:t> been moved “up” to web namespace</a:t>
-            </a:r>
-            <a:endParaRPr lang="en-US" dirty="0" smtClean="0"/>
+              <a:t>Application does something cool</a:t>
+            </a:r>
+          </a:p>
+          <a:p>
+            <a:pPr marL="228600" indent="-228600">
+              <a:buAutoNum type="arabicPeriod"/>
+            </a:pPr>
+            <a:r>
+              <a:rPr lang="en-US" baseline="0" dirty="0" smtClean="0"/>
+              <a:t>Response is sent back to the Internets</a:t>
+            </a:r>
+          </a:p>
+          <a:p>
+            <a:pPr marL="228600" indent="-228600">
+              <a:buAutoNum type="arabicPeriod"/>
+            </a:pPr>
+            <a:endParaRPr lang="en-US" baseline="0" dirty="0" smtClean="0"/>
+          </a:p>
+          <a:p>
+            <a:pPr marL="228600" indent="-228600">
+              <a:buNone/>
+            </a:pPr>
+            <a:r>
+              <a:rPr lang="en-US" baseline="0" dirty="0" smtClean="0"/>
+              <a:t>No Postback</a:t>
+            </a:r>
+          </a:p>
+          <a:p>
+            <a:pPr marL="228600" indent="-228600">
+              <a:buNone/>
+            </a:pPr>
+            <a:r>
+              <a:rPr lang="en-US" baseline="0" dirty="0" smtClean="0"/>
+              <a:t>Page lifecycle still happens (look at trace)</a:t>
+            </a:r>
+          </a:p>
+          <a:p>
+            <a:pPr marL="228600" indent="-228600">
+              <a:buNone/>
+            </a:pPr>
+            <a:r>
+              <a:rPr lang="en-US" baseline="0" dirty="0" smtClean="0"/>
+              <a:t>Still based on asp.net</a:t>
+            </a:r>
           </a:p>
         </p:txBody>
       </p:sp>
@@ -1792,7 +1746,7 @@
             <a:fld id="{F8007F4E-10F5-4104-9EF8-E98D370060A3}" type="slidenum">
               <a:rPr lang="en-US" smtClean="0"/>
               <a:pPr/>
-              <a:t>21</a:t>
+              <a:t>18</a:t>
             </a:fld>
             <a:endParaRPr lang="en-US"/>
           </a:p>
@@ -1852,28 +1806,92 @@
           </a:bodyPr>
           <a:lstStyle/>
           <a:p>
+            <a:pPr marL="228600" indent="-228600">
+              <a:buNone/>
+            </a:pPr>
             <a:r>
               <a:rPr lang="en-US" dirty="0" smtClean="0"/>
-              <a:t>Lower maintenance over time.</a:t>
-            </a:r>
-          </a:p>
-          <a:p>
+              <a:t>STEVE</a:t>
+            </a:r>
+          </a:p>
+          <a:p>
+            <a:pPr marL="228600" indent="-228600">
+              <a:buNone/>
+            </a:pPr>
             <a:endParaRPr lang="en-US" dirty="0" smtClean="0"/>
           </a:p>
           <a:p>
+            <a:pPr marL="228600" indent="-228600">
+              <a:buNone/>
+            </a:pPr>
             <a:r>
               <a:rPr lang="en-US" dirty="0" smtClean="0"/>
-              <a:t>Views handle one specific need.</a:t>
-            </a:r>
-          </a:p>
-          <a:p>
-            <a:r>
-              <a:rPr lang="en-US" dirty="0" smtClean="0"/>
-              <a:t>Controller code much more concise</a:t>
+              <a:t>Encourage</a:t>
             </a:r>
             <a:r>
               <a:rPr lang="en-US" baseline="0" dirty="0" smtClean="0"/>
-              <a:t> than the event driven code behinds.</a:t>
+              <a:t> </a:t>
+            </a:r>
+            <a:r>
+              <a:rPr lang="en-US" baseline="0" dirty="0" smtClean="0"/>
+              <a:t>use of OOP principles</a:t>
+            </a:r>
+          </a:p>
+          <a:p>
+            <a:pPr marL="685800" lvl="1" indent="-228600">
+              <a:buAutoNum type="arabicPeriod"/>
+            </a:pPr>
+            <a:r>
+              <a:rPr lang="en-US" baseline="0" dirty="0" smtClean="0"/>
+              <a:t>Separation of Concerns</a:t>
+            </a:r>
+          </a:p>
+          <a:p>
+            <a:pPr marL="685800" lvl="1" indent="-228600">
+              <a:buAutoNum type="arabicPeriod"/>
+            </a:pPr>
+            <a:r>
+              <a:rPr lang="en-US" baseline="0" dirty="0" smtClean="0"/>
+              <a:t>Single </a:t>
+            </a:r>
+            <a:r>
+              <a:rPr lang="en-US" baseline="0" dirty="0" err="1" smtClean="0"/>
+              <a:t>Responsibilty</a:t>
+            </a:r>
+            <a:endParaRPr lang="en-US" baseline="0" dirty="0" smtClean="0"/>
+          </a:p>
+          <a:p>
+            <a:pPr marL="685800" lvl="1" indent="-228600">
+              <a:buAutoNum type="arabicPeriod"/>
+            </a:pPr>
+            <a:r>
+              <a:rPr lang="en-US" baseline="0" dirty="0" smtClean="0"/>
+              <a:t>Dependencies are abstracted out to </a:t>
+            </a:r>
+            <a:r>
+              <a:rPr lang="en-US" baseline="0" dirty="0" err="1" smtClean="0"/>
+              <a:t>HttpContextBase</a:t>
+            </a:r>
+            <a:r>
+              <a:rPr lang="en-US" baseline="0" dirty="0" smtClean="0"/>
+              <a:t>, </a:t>
+            </a:r>
+            <a:r>
+              <a:rPr lang="en-US" baseline="0" dirty="0" err="1" smtClean="0"/>
+              <a:t>HttpRequestBase</a:t>
+            </a:r>
+            <a:r>
+              <a:rPr lang="en-US" baseline="0" dirty="0" smtClean="0"/>
+              <a:t>, etc</a:t>
+            </a:r>
+          </a:p>
+          <a:p>
+            <a:pPr marL="685800" lvl="1" indent="-228600">
+              <a:buAutoNum type="arabicPeriod"/>
+            </a:pPr>
+            <a:r>
+              <a:rPr lang="en-US" baseline="0" dirty="0" smtClean="0"/>
+              <a:t>All Http classes now easily mocked</a:t>
             </a:r>
             <a:endParaRPr lang="en-US" dirty="0"/>
           </a:p>
@@ -1897,7 +1915,7 @@
             <a:fld id="{F8007F4E-10F5-4104-9EF8-E98D370060A3}" type="slidenum">
               <a:rPr lang="en-US" smtClean="0"/>
               <a:pPr/>
-              <a:t>22</a:t>
+              <a:t>19</a:t>
             </a:fld>
             <a:endParaRPr lang="en-US"/>
           </a:p>
@@ -1959,7 +1977,11 @@
           <a:p>
             <a:r>
               <a:rPr lang="en-US" dirty="0" smtClean="0"/>
-              <a:t>Love hockey, especially this guy…pay a lot to see him, at least.</a:t>
+              <a:t>TIM - Love </a:t>
+            </a:r>
+            <a:r>
+              <a:rPr lang="en-US" dirty="0" smtClean="0"/>
+              <a:t>hockey, especially this guy…pay a lot to see him, at least.</a:t>
             </a:r>
           </a:p>
         </p:txBody>
@@ -2042,90 +2064,103 @@
           </a:bodyPr>
           <a:lstStyle/>
           <a:p>
+            <a:pPr marL="228600" indent="-228600">
+              <a:buNone/>
+            </a:pPr>
+            <a:r>
+              <a:rPr lang="en-US" baseline="0" dirty="0" smtClean="0"/>
+              <a:t>STEVE</a:t>
+            </a:r>
+          </a:p>
+          <a:p>
+            <a:pPr marL="228600" indent="-228600">
+              <a:buNone/>
+            </a:pPr>
+            <a:endParaRPr lang="en-US" baseline="0" dirty="0" smtClean="0"/>
+          </a:p>
+          <a:p>
+            <a:pPr marL="228600" indent="-228600">
+              <a:buNone/>
+            </a:pPr>
+            <a:r>
+              <a:rPr lang="en-US" baseline="0" dirty="0" smtClean="0"/>
+              <a:t>More </a:t>
+            </a:r>
+            <a:r>
+              <a:rPr lang="en-US" baseline="0" dirty="0" smtClean="0"/>
+              <a:t>control over your HTML</a:t>
+            </a:r>
+          </a:p>
+          <a:p>
+            <a:pPr marL="228600" indent="-228600">
+              <a:buNone/>
+            </a:pPr>
+            <a:r>
+              <a:rPr lang="en-US" baseline="0" dirty="0" smtClean="0"/>
+              <a:t>Bye </a:t>
+            </a:r>
+            <a:r>
+              <a:rPr lang="en-US" baseline="0" dirty="0" err="1" smtClean="0"/>
+              <a:t>bye</a:t>
+            </a:r>
+            <a:r>
+              <a:rPr lang="en-US" baseline="0" dirty="0" smtClean="0"/>
+              <a:t> naming container</a:t>
+            </a:r>
+          </a:p>
+          <a:p>
+            <a:pPr marL="228600" indent="-228600">
+              <a:buNone/>
+            </a:pPr>
+            <a:r>
+              <a:rPr lang="en-US" baseline="0" dirty="0" err="1" smtClean="0"/>
+              <a:t>Runat</a:t>
+            </a:r>
+            <a:r>
+              <a:rPr lang="en-US" baseline="0" dirty="0" smtClean="0"/>
+              <a:t>=server no longer needed</a:t>
+            </a:r>
+            <a:endParaRPr lang="en-US" dirty="0" smtClean="0"/>
+          </a:p>
+          <a:p>
+            <a:pPr marL="228600" indent="-228600">
+              <a:buNone/>
+            </a:pPr>
             <a:r>
               <a:rPr lang="en-US" dirty="0" smtClean="0"/>
-              <a:t>Open source project</a:t>
+              <a:t>Separation of concerns, keep business logic out</a:t>
             </a:r>
             <a:r>
               <a:rPr lang="en-US" baseline="0" dirty="0" smtClean="0"/>
-              <a:t> on </a:t>
-            </a:r>
-            <a:r>
-              <a:rPr lang="en-US" baseline="0" dirty="0" err="1" smtClean="0"/>
-              <a:t>CodePlex</a:t>
-            </a:r>
-            <a:endParaRPr lang="en-US" baseline="0" dirty="0" smtClean="0"/>
-          </a:p>
-          <a:p>
+              <a:t> of</a:t>
+            </a:r>
             <a:r>
               <a:rPr lang="en-US" dirty="0" smtClean="0"/>
-              <a:t>Adding code for</a:t>
+              <a:t> your presentation code</a:t>
+            </a:r>
+          </a:p>
+          <a:p>
+            <a:pPr marL="228600" indent="-228600">
+              <a:buNone/>
+            </a:pPr>
+            <a:r>
+              <a:rPr lang="en-US" dirty="0" smtClean="0"/>
+              <a:t>Use</a:t>
             </a:r>
             <a:r>
               <a:rPr lang="en-US" baseline="0" dirty="0" smtClean="0"/>
-              <a:t> MVC to work with Castle, </a:t>
-            </a:r>
-            <a:r>
-              <a:rPr lang="en-US" baseline="0" dirty="0" err="1" smtClean="0"/>
-              <a:t>Spring.Net</a:t>
-            </a:r>
+              <a:t> of CSS easier</a:t>
+            </a:r>
+          </a:p>
+          <a:p>
+            <a:pPr marL="228600" indent="-228600">
+              <a:buNone/>
+            </a:pPr>
             <a:r>
               <a:rPr lang="en-US" baseline="0" dirty="0" smtClean="0"/>
-              <a:t>, Structure Map, etc.</a:t>
-            </a:r>
-          </a:p>
-          <a:p>
-            <a:r>
-              <a:rPr lang="en-US" baseline="0" dirty="0" smtClean="0"/>
-              <a:t>Fluent Html</a:t>
-            </a:r>
-          </a:p>
-          <a:p>
-            <a:r>
-              <a:rPr lang="en-US" baseline="0" dirty="0" smtClean="0"/>
-              <a:t>Side-by-side with the MVC project since inception</a:t>
-            </a:r>
-          </a:p>
-          <a:p>
-            <a:r>
-              <a:rPr lang="en-US" baseline="0" dirty="0" smtClean="0"/>
-              <a:t>Original </a:t>
-            </a:r>
-            <a:r>
-              <a:rPr lang="en-US" baseline="0" dirty="0" err="1" smtClean="0"/>
-              <a:t>HtmlHelpers</a:t>
-            </a:r>
-            <a:r>
-              <a:rPr lang="en-US" baseline="0" dirty="0" smtClean="0"/>
-              <a:t> folded into release 2, </a:t>
-            </a:r>
-            <a:r>
-              <a:rPr lang="en-US" baseline="0" dirty="0" err="1" smtClean="0"/>
-              <a:t>MvcContrib</a:t>
-            </a:r>
-            <a:r>
-              <a:rPr lang="en-US" baseline="0" dirty="0" smtClean="0"/>
-              <a:t> picking up where they left off</a:t>
-            </a:r>
-          </a:p>
-          <a:p>
-            <a:r>
-              <a:rPr lang="en-US" baseline="0" dirty="0" smtClean="0"/>
-              <a:t>Warning: Requires </a:t>
-            </a:r>
-            <a:r>
-              <a:rPr lang="en-US" baseline="0" dirty="0" err="1" smtClean="0"/>
-              <a:t>Microsoft.Web.Mvc</a:t>
-            </a:r>
-            <a:r>
-              <a:rPr lang="en-US" baseline="0" dirty="0" smtClean="0"/>
-              <a:t> in addition to the regular MVC </a:t>
-            </a:r>
-            <a:r>
-              <a:rPr lang="en-US" baseline="0" dirty="0" err="1" smtClean="0"/>
-              <a:t>dll</a:t>
-            </a:r>
-            <a:endParaRPr lang="en-US" baseline="0" dirty="0" smtClean="0"/>
+              <a:t>Notice return of “Classic ASP” type code</a:t>
+            </a:r>
+            <a:endParaRPr lang="en-US" dirty="0" smtClean="0"/>
           </a:p>
           <a:p>
             <a:endParaRPr lang="en-US" dirty="0"/>
@@ -2150,7 +2185,7 @@
             <a:fld id="{F8007F4E-10F5-4104-9EF8-E98D370060A3}" type="slidenum">
               <a:rPr lang="en-US" smtClean="0"/>
               <a:pPr/>
-              <a:t>23</a:t>
+              <a:t>20</a:t>
             </a:fld>
             <a:endParaRPr lang="en-US"/>
           </a:p>
@@ -2210,89 +2245,63 @@
           </a:bodyPr>
           <a:lstStyle/>
           <a:p>
-            <a:pPr marL="228600" indent="-228600">
-              <a:buAutoNum type="arabicPeriod"/>
+            <a:r>
+              <a:rPr lang="en-US" baseline="0" dirty="0" smtClean="0"/>
+              <a:t>STEVE</a:t>
+            </a:r>
+          </a:p>
+          <a:p>
+            <a:endParaRPr lang="en-US" baseline="0" dirty="0" smtClean="0"/>
+          </a:p>
+          <a:p>
+            <a:r>
+              <a:rPr lang="en-US" baseline="0" dirty="0" smtClean="0"/>
+              <a:t>Routing</a:t>
+            </a:r>
+            <a:endParaRPr lang="en-US" dirty="0" smtClean="0"/>
+          </a:p>
+          <a:p>
+            <a:pPr lvl="1">
+              <a:buFont typeface="Arial" pitchFamily="34" charset="0"/>
+              <a:buChar char="•"/>
             </a:pPr>
             <a:r>
+              <a:rPr lang="en-US" dirty="0" smtClean="0"/>
+              <a:t>Maps incoming URLs to the correct Controllers</a:t>
+            </a:r>
+          </a:p>
+          <a:p>
+            <a:pPr lvl="1">
+              <a:buFont typeface="Arial" pitchFamily="34" charset="0"/>
+              <a:buChar char="•"/>
+            </a:pPr>
+            <a:r>
+              <a:rPr lang="en-US" dirty="0" smtClean="0"/>
+              <a:t>Maps outgoing URLs so they can be called back</a:t>
+            </a:r>
+          </a:p>
+          <a:p>
+            <a:pPr lvl="1">
+              <a:buFont typeface="Arial" pitchFamily="34" charset="0"/>
+              <a:buChar char="•"/>
+            </a:pPr>
+            <a:r>
+              <a:rPr lang="en-US" dirty="0" smtClean="0"/>
+              <a:t>Originally part of </a:t>
+            </a:r>
+            <a:r>
+              <a:rPr lang="en-US" dirty="0" err="1" smtClean="0"/>
+              <a:t>mvc</a:t>
+            </a:r>
+            <a:r>
+              <a:rPr lang="en-US" dirty="0" smtClean="0"/>
+              <a:t> namespace, has</a:t>
+            </a:r>
+            <a:r>
               <a:rPr lang="en-US" baseline="0" dirty="0" smtClean="0"/>
-              <a:t>Much more mature framework to build </a:t>
-            </a:r>
-            <a:r>
-              <a:rPr lang="en-US" baseline="0" dirty="0" err="1" smtClean="0"/>
-              <a:t>ASP.Net</a:t>
-            </a:r>
-            <a:r>
-              <a:rPr lang="en-US" baseline="0" dirty="0" smtClean="0"/>
-              <a:t> apps on</a:t>
-            </a:r>
-          </a:p>
-          <a:p>
-            <a:pPr marL="228600" indent="-228600">
-              <a:buAutoNum type="arabicPeriod"/>
-            </a:pPr>
-            <a:r>
-              <a:rPr lang="en-US" baseline="0" dirty="0" smtClean="0"/>
-              <a:t>Quicker deployment, more drag and drop</a:t>
-            </a:r>
-          </a:p>
-          <a:p>
-            <a:pPr marL="228600" indent="-228600">
-              <a:buAutoNum type="arabicPeriod"/>
-            </a:pPr>
-            <a:r>
-              <a:rPr lang="en-US" baseline="0" dirty="0" smtClean="0"/>
-              <a:t>More Better UI controls available.</a:t>
-            </a:r>
-          </a:p>
-          <a:p>
-            <a:pPr marL="228600" indent="-228600">
-              <a:buAutoNum type="arabicPeriod"/>
-            </a:pPr>
-            <a:r>
-              <a:rPr lang="en-US" baseline="0" dirty="0" smtClean="0"/>
-              <a:t>Lots of 3</a:t>
-            </a:r>
-            <a:r>
-              <a:rPr lang="en-US" baseline="30000" dirty="0" smtClean="0"/>
-              <a:t>rd</a:t>
-            </a:r>
-            <a:r>
-              <a:rPr lang="en-US" baseline="0" dirty="0" smtClean="0"/>
-              <a:t> party controls available…like our Friends at </a:t>
-            </a:r>
-            <a:r>
-              <a:rPr lang="en-US" baseline="0" dirty="0" err="1" smtClean="0"/>
-              <a:t>Telerik</a:t>
-            </a:r>
-            <a:endParaRPr lang="en-US" baseline="0" dirty="0" smtClean="0"/>
-          </a:p>
-          <a:p>
-            <a:pPr marL="228600" indent="-228600">
-              <a:buAutoNum type="arabicPeriod"/>
-            </a:pPr>
-            <a:r>
-              <a:rPr lang="en-US" baseline="0" dirty="0" smtClean="0"/>
-              <a:t>Better Documentation</a:t>
-            </a:r>
-          </a:p>
-          <a:p>
-            <a:pPr marL="228600" indent="-228600">
-              <a:buAutoNum type="arabicPeriod"/>
-            </a:pPr>
-            <a:r>
-              <a:rPr lang="en-US" baseline="0" dirty="0" smtClean="0"/>
-              <a:t>More examples and code samples to draw from</a:t>
-            </a:r>
-          </a:p>
-          <a:p>
-            <a:pPr marL="228600" indent="-228600">
-              <a:buAutoNum type="arabicPeriod"/>
-            </a:pPr>
-            <a:r>
-              <a:rPr lang="en-US" baseline="0" dirty="0" smtClean="0"/>
-              <a:t>And, of course, the update panel!</a:t>
-            </a:r>
-            <a:endParaRPr lang="en-US" dirty="0"/>
+              <a:t> been moved “up” to web namespace</a:t>
+            </a:r>
+            <a:endParaRPr lang="en-US" dirty="0" smtClean="0"/>
           </a:p>
         </p:txBody>
       </p:sp>
@@ -2314,7 +2323,7 @@
             <a:fld id="{F8007F4E-10F5-4104-9EF8-E98D370060A3}" type="slidenum">
               <a:rPr lang="en-US" smtClean="0"/>
               <a:pPr/>
-              <a:t>24</a:t>
+              <a:t>21</a:t>
             </a:fld>
             <a:endParaRPr lang="en-US"/>
           </a:p>
@@ -2374,61 +2383,41 @@
           </a:bodyPr>
           <a:lstStyle/>
           <a:p>
-            <a:pPr marL="228600" indent="-228600">
-              <a:buAutoNum type="arabicPeriod"/>
-            </a:pPr>
             <a:r>
               <a:rPr lang="en-US" dirty="0" smtClean="0"/>
-              <a:t>Fluent</a:t>
+              <a:t>TIM</a:t>
+            </a:r>
+          </a:p>
+          <a:p>
+            <a:endParaRPr lang="en-US" dirty="0" smtClean="0"/>
+          </a:p>
+          <a:p>
+            <a:r>
+              <a:rPr lang="en-US" dirty="0" smtClean="0"/>
+              <a:t>Lower </a:t>
+            </a:r>
+            <a:r>
+              <a:rPr lang="en-US" dirty="0" smtClean="0"/>
+              <a:t>maintenance over time.</a:t>
+            </a:r>
+          </a:p>
+          <a:p>
+            <a:endParaRPr lang="en-US" dirty="0" smtClean="0"/>
+          </a:p>
+          <a:p>
+            <a:r>
+              <a:rPr lang="en-US" dirty="0" smtClean="0"/>
+              <a:t>Views handle one specific need.</a:t>
+            </a:r>
+          </a:p>
+          <a:p>
+            <a:r>
+              <a:rPr lang="en-US" dirty="0" smtClean="0"/>
+              <a:t>Controller code much more concise</a:t>
             </a:r>
             <a:r>
               <a:rPr lang="en-US" baseline="0" dirty="0" smtClean="0"/>
-              <a:t> </a:t>
-            </a:r>
-            <a:r>
-              <a:rPr lang="en-US" baseline="0" dirty="0" err="1" smtClean="0"/>
-              <a:t>nHibernate</a:t>
-            </a:r>
-            <a:endParaRPr lang="en-US" baseline="0" dirty="0" smtClean="0"/>
-          </a:p>
-          <a:p>
-            <a:pPr marL="228600" indent="-228600">
-              <a:buAutoNum type="arabicPeriod"/>
-            </a:pPr>
-            <a:r>
-              <a:rPr lang="en-US" baseline="0" dirty="0" smtClean="0"/>
-              <a:t>SQLite3</a:t>
-            </a:r>
-          </a:p>
-          <a:p>
-            <a:pPr marL="228600" indent="-228600">
-              <a:buAutoNum type="arabicPeriod"/>
-            </a:pPr>
-            <a:r>
-              <a:rPr lang="en-US" baseline="0" dirty="0" smtClean="0"/>
-              <a:t>Inversion of control</a:t>
-            </a:r>
-          </a:p>
-          <a:p>
-            <a:pPr marL="228600" indent="-228600">
-              <a:buAutoNum type="arabicPeriod"/>
-            </a:pPr>
-            <a:r>
-              <a:rPr lang="en-US" baseline="0" dirty="0" smtClean="0"/>
-              <a:t>Not perfect “One model in, one model out” design…but close</a:t>
-            </a:r>
-          </a:p>
-          <a:p>
-            <a:pPr marL="228600" indent="-228600">
-              <a:buAutoNum type="arabicPeriod"/>
-            </a:pPr>
-            <a:r>
-              <a:rPr lang="en-US" baseline="0" dirty="0" smtClean="0"/>
-              <a:t>Partial views if </a:t>
-            </a:r>
-            <a:r>
-              <a:rPr lang="en-US" baseline="0" smtClean="0"/>
-              <a:t>we get time</a:t>
+              <a:t> than the event driven code behinds.</a:t>
             </a:r>
             <a:endParaRPr lang="en-US" dirty="0"/>
           </a:p>
@@ -2452,7 +2441,7 @@
             <a:fld id="{F8007F4E-10F5-4104-9EF8-E98D370060A3}" type="slidenum">
               <a:rPr lang="en-US" smtClean="0"/>
               <a:pPr/>
-              <a:t>25</a:t>
+              <a:t>22</a:t>
             </a:fld>
             <a:endParaRPr lang="en-US"/>
           </a:p>
@@ -2512,6 +2501,106 @@
           </a:bodyPr>
           <a:lstStyle/>
           <a:p>
+            <a:r>
+              <a:rPr lang="en-US" smtClean="0"/>
+              <a:t>STEVE</a:t>
+            </a:r>
+            <a:endParaRPr lang="en-US" dirty="0" smtClean="0"/>
+          </a:p>
+          <a:p>
+            <a:endParaRPr lang="en-US" dirty="0" smtClean="0"/>
+          </a:p>
+          <a:p>
+            <a:r>
+              <a:rPr lang="en-US" dirty="0" smtClean="0"/>
+              <a:t>Open </a:t>
+            </a:r>
+            <a:r>
+              <a:rPr lang="en-US" dirty="0" smtClean="0"/>
+              <a:t>source project</a:t>
+            </a:r>
+            <a:r>
+              <a:rPr lang="en-US" baseline="0" dirty="0" smtClean="0"/>
+              <a:t> on </a:t>
+            </a:r>
+            <a:r>
+              <a:rPr lang="en-US" baseline="0" dirty="0" err="1" smtClean="0"/>
+              <a:t>CodePlex</a:t>
+            </a:r>
+            <a:endParaRPr lang="en-US" baseline="0" dirty="0" smtClean="0"/>
+          </a:p>
+          <a:p>
+            <a:r>
+              <a:rPr lang="en-US" dirty="0" smtClean="0"/>
+              <a:t>Adding code for</a:t>
+            </a:r>
+            <a:r>
+              <a:rPr lang="en-US" baseline="0" dirty="0" smtClean="0"/>
+              <a:t> MVC to work with Castle, </a:t>
+            </a:r>
+            <a:r>
+              <a:rPr lang="en-US" baseline="0" dirty="0" err="1" smtClean="0"/>
+              <a:t>Spring.Net</a:t>
+            </a:r>
+            <a:r>
+              <a:rPr lang="en-US" baseline="0" dirty="0" smtClean="0"/>
+              <a:t>, Structure Map, etc.</a:t>
+            </a:r>
+          </a:p>
+          <a:p>
+            <a:r>
+              <a:rPr lang="en-US" baseline="0" dirty="0" smtClean="0"/>
+              <a:t>Fluent Html</a:t>
+            </a:r>
+          </a:p>
+          <a:p>
+            <a:r>
+              <a:rPr lang="en-US" baseline="0" dirty="0" smtClean="0"/>
+              <a:t>Side-by-side with the MVC project since inception</a:t>
+            </a:r>
+          </a:p>
+          <a:p>
+            <a:r>
+              <a:rPr lang="en-US" baseline="0" dirty="0" smtClean="0"/>
+              <a:t>Original </a:t>
+            </a:r>
+            <a:r>
+              <a:rPr lang="en-US" baseline="0" dirty="0" err="1" smtClean="0"/>
+              <a:t>HtmlHelpers</a:t>
+            </a:r>
+            <a:r>
+              <a:rPr lang="en-US" baseline="0" dirty="0" smtClean="0"/>
+              <a:t> folded into release 2, </a:t>
+            </a:r>
+            <a:r>
+              <a:rPr lang="en-US" baseline="0" dirty="0" err="1" smtClean="0"/>
+              <a:t>MvcContrib</a:t>
+            </a:r>
+            <a:r>
+              <a:rPr lang="en-US" baseline="0" dirty="0" smtClean="0"/>
+              <a:t> picking up where they left off</a:t>
+            </a:r>
+          </a:p>
+          <a:p>
+            <a:r>
+              <a:rPr lang="en-US" baseline="0" dirty="0" smtClean="0"/>
+              <a:t>Warning: Requires </a:t>
+            </a:r>
+            <a:r>
+              <a:rPr lang="en-US" baseline="0" dirty="0" err="1" smtClean="0"/>
+              <a:t>Microsoft.Web.Mvc</a:t>
+            </a:r>
+            <a:r>
+              <a:rPr lang="en-US" baseline="0" dirty="0" smtClean="0"/>
+              <a:t> in addition to the regular MVC </a:t>
+            </a:r>
+            <a:r>
+              <a:rPr lang="en-US" baseline="0" dirty="0" err="1" smtClean="0"/>
+              <a:t>dll</a:t>
+            </a:r>
+            <a:endParaRPr lang="en-US" baseline="0" dirty="0" smtClean="0"/>
+          </a:p>
+          <a:p>
             <a:endParaRPr lang="en-US" dirty="0"/>
           </a:p>
         </p:txBody>
@@ -2534,7 +2623,7 @@
             <a:fld id="{F8007F4E-10F5-4104-9EF8-E98D370060A3}" type="slidenum">
               <a:rPr lang="en-US" smtClean="0"/>
               <a:pPr/>
-              <a:t>26</a:t>
+              <a:t>23</a:t>
             </a:fld>
             <a:endParaRPr lang="en-US"/>
           </a:p>
@@ -2594,6 +2683,405 @@
           </a:bodyPr>
           <a:lstStyle/>
           <a:p>
+            <a:pPr marL="228600" indent="-228600">
+              <a:buNone/>
+            </a:pPr>
+            <a:r>
+              <a:rPr lang="en-US" baseline="0" dirty="0" smtClean="0"/>
+              <a:t>TIM</a:t>
+            </a:r>
+          </a:p>
+          <a:p>
+            <a:pPr marL="228600" indent="-228600">
+              <a:buAutoNum type="arabicPeriod"/>
+            </a:pPr>
+            <a:endParaRPr lang="en-US" baseline="0" dirty="0" smtClean="0"/>
+          </a:p>
+          <a:p>
+            <a:pPr marL="228600" indent="-228600">
+              <a:buAutoNum type="arabicPeriod"/>
+            </a:pPr>
+            <a:r>
+              <a:rPr lang="en-US" baseline="0" dirty="0" smtClean="0"/>
+              <a:t>Much </a:t>
+            </a:r>
+            <a:r>
+              <a:rPr lang="en-US" baseline="0" dirty="0" smtClean="0"/>
+              <a:t>more mature framework to build </a:t>
+            </a:r>
+            <a:r>
+              <a:rPr lang="en-US" baseline="0" dirty="0" err="1" smtClean="0"/>
+              <a:t>ASP.Net</a:t>
+            </a:r>
+            <a:r>
+              <a:rPr lang="en-US" baseline="0" dirty="0" smtClean="0"/>
+              <a:t> apps on</a:t>
+            </a:r>
+          </a:p>
+          <a:p>
+            <a:pPr marL="228600" indent="-228600">
+              <a:buAutoNum type="arabicPeriod"/>
+            </a:pPr>
+            <a:r>
+              <a:rPr lang="en-US" baseline="0" dirty="0" smtClean="0"/>
+              <a:t>Quicker deployment, more drag and drop</a:t>
+            </a:r>
+          </a:p>
+          <a:p>
+            <a:pPr marL="228600" indent="-228600">
+              <a:buAutoNum type="arabicPeriod"/>
+            </a:pPr>
+            <a:r>
+              <a:rPr lang="en-US" baseline="0" dirty="0" smtClean="0"/>
+              <a:t>More Better UI controls available.</a:t>
+            </a:r>
+          </a:p>
+          <a:p>
+            <a:pPr marL="228600" indent="-228600">
+              <a:buAutoNum type="arabicPeriod"/>
+            </a:pPr>
+            <a:r>
+              <a:rPr lang="en-US" baseline="0" dirty="0" smtClean="0"/>
+              <a:t>Lots of 3</a:t>
+            </a:r>
+            <a:r>
+              <a:rPr lang="en-US" baseline="30000" dirty="0" smtClean="0"/>
+              <a:t>rd</a:t>
+            </a:r>
+            <a:r>
+              <a:rPr lang="en-US" baseline="0" dirty="0" smtClean="0"/>
+              <a:t> party controls available…like our Friends at </a:t>
+            </a:r>
+            <a:r>
+              <a:rPr lang="en-US" baseline="0" dirty="0" err="1" smtClean="0"/>
+              <a:t>Telerik</a:t>
+            </a:r>
+            <a:endParaRPr lang="en-US" baseline="0" dirty="0" smtClean="0"/>
+          </a:p>
+          <a:p>
+            <a:pPr marL="228600" indent="-228600">
+              <a:buAutoNum type="arabicPeriod"/>
+            </a:pPr>
+            <a:r>
+              <a:rPr lang="en-US" baseline="0" dirty="0" smtClean="0"/>
+              <a:t>Better Documentation</a:t>
+            </a:r>
+          </a:p>
+          <a:p>
+            <a:pPr marL="228600" indent="-228600">
+              <a:buAutoNum type="arabicPeriod"/>
+            </a:pPr>
+            <a:r>
+              <a:rPr lang="en-US" baseline="0" dirty="0" smtClean="0"/>
+              <a:t>More examples and code samples to draw from</a:t>
+            </a:r>
+          </a:p>
+          <a:p>
+            <a:pPr marL="228600" indent="-228600">
+              <a:buAutoNum type="arabicPeriod"/>
+            </a:pPr>
+            <a:r>
+              <a:rPr lang="en-US" baseline="0" dirty="0" smtClean="0"/>
+              <a:t>And, of course, the update panel!</a:t>
+            </a:r>
+            <a:endParaRPr lang="en-US" dirty="0"/>
+          </a:p>
+        </p:txBody>
+      </p:sp>
+      <p:sp>
+        <p:nvSpPr>
+          <p:cNvPr id="4" name="Slide Number Placeholder 3"/>
+          <p:cNvSpPr>
+            <a:spLocks noGrp="1"/>
+          </p:cNvSpPr>
+          <p:nvPr>
+            <p:ph type="sldNum" sz="quarter" idx="10"/>
+          </p:nvPr>
+        </p:nvSpPr>
+        <p:spPr/>
+        <p:txBody>
+          <a:bodyPr/>
+          <a:lstStyle/>
+          <a:p>
+            <a:fld id="{F8007F4E-10F5-4104-9EF8-E98D370060A3}" type="slidenum">
+              <a:rPr lang="en-US" smtClean="0"/>
+              <a:pPr/>
+              <a:t>24</a:t>
+            </a:fld>
+            <a:endParaRPr lang="en-US"/>
+          </a:p>
+        </p:txBody>
+      </p:sp>
+    </p:spTree>
+  </p:cSld>
+  <p:clrMapOvr>
+    <a:masterClrMapping/>
+  </p:clrMapOvr>
+</p:notes>
+</file>
+
+<file path=ppt/notesSlides/notesSlide25.xml><?xml version="1.0" encoding="utf-8"?>
+<p:notes xmlns:a="http://schemas.openxmlformats.org/drawingml/2006/main" xmlns:r="http://schemas.openxmlformats.org/officeDocument/2006/relationships" xmlns:p="http://schemas.openxmlformats.org/presentationml/2006/main">
+  <p:cSld>
+    <p:spTree>
+      <p:nvGrpSpPr>
+        <p:cNvPr id="1" name=""/>
+        <p:cNvGrpSpPr/>
+        <p:nvPr/>
+      </p:nvGrpSpPr>
+      <p:grpSpPr>
+        <a:xfrm>
+          <a:off x="0" y="0"/>
+          <a:ext cx="0" cy="0"/>
+          <a:chOff x="0" y="0"/>
+          <a:chExt cx="0" cy="0"/>
+        </a:xfrm>
+      </p:grpSpPr>
+      <p:sp>
+        <p:nvSpPr>
+          <p:cNvPr id="2" name="Slide Image Placeholder 1"/>
+          <p:cNvSpPr>
+            <a:spLocks noGrp="1" noRot="1" noChangeAspect="1"/>
+          </p:cNvSpPr>
+          <p:nvPr>
+            <p:ph type="sldImg"/>
+          </p:nvPr>
+        </p:nvSpPr>
+        <p:spPr/>
+      </p:sp>
+      <p:sp>
+        <p:nvSpPr>
+          <p:cNvPr id="3" name="Notes Placeholder 2"/>
+          <p:cNvSpPr>
+            <a:spLocks noGrp="1"/>
+          </p:cNvSpPr>
+          <p:nvPr>
+            <p:ph type="body" idx="1"/>
+          </p:nvPr>
+        </p:nvSpPr>
+        <p:spPr/>
+        <p:txBody>
+          <a:bodyPr>
+            <a:normAutofit/>
+          </a:bodyPr>
+          <a:lstStyle/>
+          <a:p>
+            <a:pPr marL="228600" indent="-228600">
+              <a:buAutoNum type="arabicPeriod"/>
+            </a:pPr>
+            <a:r>
+              <a:rPr lang="en-US" dirty="0" smtClean="0"/>
+              <a:t>Fluent</a:t>
+            </a:r>
+            <a:r>
+              <a:rPr lang="en-US" baseline="0" dirty="0" smtClean="0"/>
+              <a:t> </a:t>
+            </a:r>
+            <a:r>
+              <a:rPr lang="en-US" baseline="0" dirty="0" err="1" smtClean="0"/>
+              <a:t>nHibernate</a:t>
+            </a:r>
+            <a:endParaRPr lang="en-US" baseline="0" dirty="0" smtClean="0"/>
+          </a:p>
+          <a:p>
+            <a:pPr marL="228600" indent="-228600">
+              <a:buAutoNum type="arabicPeriod"/>
+            </a:pPr>
+            <a:r>
+              <a:rPr lang="en-US" baseline="0" dirty="0" smtClean="0"/>
+              <a:t>SQLite3</a:t>
+            </a:r>
+          </a:p>
+          <a:p>
+            <a:pPr marL="228600" indent="-228600">
+              <a:buAutoNum type="arabicPeriod"/>
+            </a:pPr>
+            <a:r>
+              <a:rPr lang="en-US" baseline="0" dirty="0" smtClean="0"/>
+              <a:t>Inversion of control</a:t>
+            </a:r>
+          </a:p>
+          <a:p>
+            <a:pPr marL="228600" indent="-228600">
+              <a:buAutoNum type="arabicPeriod"/>
+            </a:pPr>
+            <a:r>
+              <a:rPr lang="en-US" baseline="0" dirty="0" smtClean="0"/>
+              <a:t>Not perfect “One model in, one model out” design…but close</a:t>
+            </a:r>
+          </a:p>
+          <a:p>
+            <a:pPr marL="228600" indent="-228600">
+              <a:buAutoNum type="arabicPeriod"/>
+            </a:pPr>
+            <a:r>
+              <a:rPr lang="en-US" baseline="0" dirty="0" smtClean="0"/>
+              <a:t>Partial views if we get time</a:t>
+            </a:r>
+            <a:endParaRPr lang="en-US" dirty="0"/>
+          </a:p>
+        </p:txBody>
+      </p:sp>
+      <p:sp>
+        <p:nvSpPr>
+          <p:cNvPr id="4" name="Slide Number Placeholder 3"/>
+          <p:cNvSpPr>
+            <a:spLocks noGrp="1"/>
+          </p:cNvSpPr>
+          <p:nvPr>
+            <p:ph type="sldNum" sz="quarter" idx="10"/>
+          </p:nvPr>
+        </p:nvSpPr>
+        <p:spPr/>
+        <p:txBody>
+          <a:bodyPr/>
+          <a:lstStyle/>
+          <a:p>
+            <a:fld id="{F8007F4E-10F5-4104-9EF8-E98D370060A3}" type="slidenum">
+              <a:rPr lang="en-US" smtClean="0"/>
+              <a:pPr/>
+              <a:t>25</a:t>
+            </a:fld>
+            <a:endParaRPr lang="en-US"/>
+          </a:p>
+        </p:txBody>
+      </p:sp>
+    </p:spTree>
+  </p:cSld>
+  <p:clrMapOvr>
+    <a:masterClrMapping/>
+  </p:clrMapOvr>
+</p:notes>
+</file>
+
+<file path=ppt/notesSlides/notesSlide26.xml><?xml version="1.0" encoding="utf-8"?>
+<p:notes xmlns:a="http://schemas.openxmlformats.org/drawingml/2006/main" xmlns:r="http://schemas.openxmlformats.org/officeDocument/2006/relationships" xmlns:p="http://schemas.openxmlformats.org/presentationml/2006/main">
+  <p:cSld>
+    <p:spTree>
+      <p:nvGrpSpPr>
+        <p:cNvPr id="1" name=""/>
+        <p:cNvGrpSpPr/>
+        <p:nvPr/>
+      </p:nvGrpSpPr>
+      <p:grpSpPr>
+        <a:xfrm>
+          <a:off x="0" y="0"/>
+          <a:ext cx="0" cy="0"/>
+          <a:chOff x="0" y="0"/>
+          <a:chExt cx="0" cy="0"/>
+        </a:xfrm>
+      </p:grpSpPr>
+      <p:sp>
+        <p:nvSpPr>
+          <p:cNvPr id="2" name="Slide Image Placeholder 1"/>
+          <p:cNvSpPr>
+            <a:spLocks noGrp="1" noRot="1" noChangeAspect="1"/>
+          </p:cNvSpPr>
+          <p:nvPr>
+            <p:ph type="sldImg"/>
+          </p:nvPr>
+        </p:nvSpPr>
+        <p:spPr/>
+      </p:sp>
+      <p:sp>
+        <p:nvSpPr>
+          <p:cNvPr id="3" name="Notes Placeholder 2"/>
+          <p:cNvSpPr>
+            <a:spLocks noGrp="1"/>
+          </p:cNvSpPr>
+          <p:nvPr>
+            <p:ph type="body" idx="1"/>
+          </p:nvPr>
+        </p:nvSpPr>
+        <p:spPr/>
+        <p:txBody>
+          <a:bodyPr>
+            <a:normAutofit/>
+          </a:bodyPr>
+          <a:lstStyle/>
+          <a:p>
+            <a:endParaRPr lang="en-US" dirty="0"/>
+          </a:p>
+        </p:txBody>
+      </p:sp>
+      <p:sp>
+        <p:nvSpPr>
+          <p:cNvPr id="4" name="Slide Number Placeholder 3"/>
+          <p:cNvSpPr>
+            <a:spLocks noGrp="1"/>
+          </p:cNvSpPr>
+          <p:nvPr>
+            <p:ph type="sldNum" sz="quarter" idx="10"/>
+          </p:nvPr>
+        </p:nvSpPr>
+        <p:spPr/>
+        <p:txBody>
+          <a:bodyPr/>
+          <a:lstStyle/>
+          <a:p>
+            <a:fld id="{F8007F4E-10F5-4104-9EF8-E98D370060A3}" type="slidenum">
+              <a:rPr lang="en-US" smtClean="0"/>
+              <a:pPr/>
+              <a:t>26</a:t>
+            </a:fld>
+            <a:endParaRPr lang="en-US"/>
+          </a:p>
+        </p:txBody>
+      </p:sp>
+    </p:spTree>
+  </p:cSld>
+  <p:clrMapOvr>
+    <a:masterClrMapping/>
+  </p:clrMapOvr>
+</p:notes>
+</file>
+
+<file path=ppt/notesSlides/notesSlide27.xml><?xml version="1.0" encoding="utf-8"?>
+<p:notes xmlns:a="http://schemas.openxmlformats.org/drawingml/2006/main" xmlns:r="http://schemas.openxmlformats.org/officeDocument/2006/relationships" xmlns:p="http://schemas.openxmlformats.org/presentationml/2006/main">
+  <p:cSld>
+    <p:spTree>
+      <p:nvGrpSpPr>
+        <p:cNvPr id="1" name=""/>
+        <p:cNvGrpSpPr/>
+        <p:nvPr/>
+      </p:nvGrpSpPr>
+      <p:grpSpPr>
+        <a:xfrm>
+          <a:off x="0" y="0"/>
+          <a:ext cx="0" cy="0"/>
+          <a:chOff x="0" y="0"/>
+          <a:chExt cx="0" cy="0"/>
+        </a:xfrm>
+      </p:grpSpPr>
+      <p:sp>
+        <p:nvSpPr>
+          <p:cNvPr id="2" name="Slide Image Placeholder 1"/>
+          <p:cNvSpPr>
+            <a:spLocks noGrp="1" noRot="1" noChangeAspect="1"/>
+          </p:cNvSpPr>
+          <p:nvPr>
+            <p:ph type="sldImg"/>
+          </p:nvPr>
+        </p:nvSpPr>
+        <p:spPr/>
+      </p:sp>
+      <p:sp>
+        <p:nvSpPr>
+          <p:cNvPr id="3" name="Notes Placeholder 2"/>
+          <p:cNvSpPr>
+            <a:spLocks noGrp="1"/>
+          </p:cNvSpPr>
+          <p:nvPr>
+            <p:ph type="body" idx="1"/>
+          </p:nvPr>
+        </p:nvSpPr>
+        <p:spPr/>
+        <p:txBody>
+          <a:bodyPr>
+            <a:normAutofit/>
+          </a:bodyPr>
+          <a:lstStyle/>
+          <a:p>
             <a:endParaRPr lang="en-US" dirty="0"/>
           </a:p>
         </p:txBody>
@@ -2678,23 +3166,7 @@
           <a:p>
             <a:r>
               <a:rPr lang="en-US" dirty="0" smtClean="0"/>
-              <a:t>Professionally, I work for Quick Solutions,</a:t>
-            </a:r>
-            <a:r>
-              <a:rPr lang="en-US" baseline="0" dirty="0" smtClean="0"/>
-              <a:t> even though none of these people do.</a:t>
-            </a:r>
-          </a:p>
-          <a:p>
-            <a:r>
-              <a:rPr lang="en-US" baseline="0" dirty="0" smtClean="0"/>
-              <a:t>Been with Quick for four years, all in the App Dev Group started by BHP.</a:t>
-            </a:r>
-          </a:p>
-          <a:p>
-            <a:r>
-              <a:rPr lang="en-US" baseline="0" dirty="0" smtClean="0"/>
-              <a:t>Been developing for over 10 years, all in Columbus.</a:t>
+              <a:t>STEVE</a:t>
             </a:r>
             <a:endParaRPr lang="en-US" dirty="0"/>
           </a:p>
@@ -2718,7 +3190,7 @@
             <a:fld id="{F8007F4E-10F5-4104-9EF8-E98D370060A3}" type="slidenum">
               <a:rPr lang="en-US" smtClean="0"/>
               <a:pPr/>
-              <a:t>4</a:t>
+              <a:t>3</a:t>
             </a:fld>
             <a:endParaRPr lang="en-US"/>
           </a:p>
@@ -2780,50 +3252,33 @@
           <a:p>
             <a:r>
               <a:rPr lang="en-US" dirty="0" smtClean="0"/>
-              <a:t>“What are we trying to</a:t>
+              <a:t>TIM &amp; STEVE</a:t>
+            </a:r>
+          </a:p>
+          <a:p>
+            <a:r>
+              <a:rPr lang="en-US" dirty="0" smtClean="0"/>
+              <a:t>Professionally</a:t>
+            </a:r>
+            <a:r>
+              <a:rPr lang="en-US" dirty="0" smtClean="0"/>
+              <a:t>, I work for Quick Solutions,</a:t>
             </a:r>
             <a:r>
               <a:rPr lang="en-US" baseline="0" dirty="0" smtClean="0"/>
-              <a:t> solve? What’s wrong with </a:t>
-            </a:r>
-            <a:r>
-              <a:rPr lang="en-US" baseline="0" dirty="0" err="1" smtClean="0"/>
-              <a:t>WebForms</a:t>
-            </a:r>
+              <a:t> even though none of these people do.</a:t>
+            </a:r>
+          </a:p>
+          <a:p>
             <a:r>
               <a:rPr lang="en-US" baseline="0" dirty="0" smtClean="0"/>
-              <a:t>?”</a:t>
-            </a:r>
-            <a:endParaRPr lang="en-US" dirty="0" smtClean="0"/>
-          </a:p>
-          <a:p>
-            <a:r>
-              <a:rPr lang="en-US" dirty="0" err="1" smtClean="0"/>
-              <a:t>WebForms</a:t>
-            </a:r>
+              <a:t>Been with Quick for four years, all in the App Dev Group started by BHP.</a:t>
+            </a:r>
+          </a:p>
+          <a:p>
             <a:r>
               <a:rPr lang="en-US" baseline="0" dirty="0" smtClean="0"/>
-              <a:t> tried to move </a:t>
-            </a:r>
-            <a:r>
-              <a:rPr lang="en-US" baseline="0" dirty="0" err="1" smtClean="0"/>
-              <a:t>WinForms</a:t>
-            </a:r>
-            <a:r>
-              <a:rPr lang="en-US" baseline="0" dirty="0" smtClean="0"/>
-              <a:t> to web development</a:t>
-            </a:r>
-          </a:p>
-          <a:p>
-            <a:r>
-              <a:rPr lang="en-US" baseline="0" dirty="0" smtClean="0"/>
-              <a:t>Some developers think this is the way the whole web works</a:t>
-            </a:r>
-          </a:p>
-          <a:p>
-            <a:r>
-              <a:rPr lang="en-US" baseline="0" dirty="0" smtClean="0"/>
-              <a:t>Introduced page event model</a:t>
+              <a:t>Been developing for over 10 years, all in Columbus.</a:t>
             </a:r>
             <a:endParaRPr lang="en-US" dirty="0"/>
           </a:p>
@@ -2847,7 +3302,7 @@
             <a:fld id="{F8007F4E-10F5-4104-9EF8-E98D370060A3}" type="slidenum">
               <a:rPr lang="en-US" smtClean="0"/>
               <a:pPr/>
-              <a:t>5</a:t>
+              <a:t>4</a:t>
             </a:fld>
             <a:endParaRPr lang="en-US"/>
           </a:p>
@@ -2909,82 +3364,65 @@
           <a:p>
             <a:r>
               <a:rPr lang="en-US" dirty="0" smtClean="0"/>
-              <a:t>Who</a:t>
+              <a:t>TIM</a:t>
+            </a:r>
+          </a:p>
+          <a:p>
+            <a:r>
+              <a:rPr lang="en-US" dirty="0" smtClean="0"/>
+              <a:t>“</a:t>
+            </a:r>
+            <a:r>
+              <a:rPr lang="en-US" dirty="0" smtClean="0"/>
+              <a:t>What are we trying to</a:t>
             </a:r>
             <a:r>
               <a:rPr lang="en-US" baseline="0" dirty="0" smtClean="0"/>
-              <a:t> doesn’t love this?</a:t>
-            </a:r>
-          </a:p>
-          <a:p>
+              <a:t> solve? What’s wrong with </a:t>
+            </a:r>
+            <a:r>
+              <a:rPr lang="en-US" baseline="0" dirty="0" err="1" smtClean="0"/>
+              <a:t>WebForms</a:t>
+            </a:r>
             <a:r>
               <a:rPr lang="en-US" baseline="0" dirty="0" smtClean="0"/>
-              <a:t>Was that </a:t>
+              <a:t>?”</a:t>
+            </a:r>
+            <a:endParaRPr lang="en-US" dirty="0" smtClean="0"/>
+          </a:p>
+          <a:p>
+            <a:r>
+              <a:rPr lang="en-US" dirty="0" err="1" smtClean="0"/>
+              <a:t>WebForms</a:t>
+            </a:r>
+            <a:r>
+              <a:rPr lang="en-US" baseline="0" dirty="0" smtClean="0"/>
+              <a:t> tried to move </a:t>
             </a:r>
             <a:r>
               <a:rPr lang="en-US" baseline="0" dirty="0" err="1" smtClean="0"/>
-              <a:t>OnPreInit</a:t>
+              <a:t>WinForms</a:t>
             </a:r>
             <a:r>
               <a:rPr lang="en-US" baseline="0" dirty="0" smtClean="0"/>
-              <a:t> or </a:t>
-            </a:r>
-            <a:r>
-              <a:rPr lang="en-US" baseline="0" dirty="0" err="1" smtClean="0"/>
-              <a:t>OnPreLoad</a:t>
-            </a:r>
+              <a:t> to web development</a:t>
+            </a:r>
+          </a:p>
+          <a:p>
             <a:r>
               <a:rPr lang="en-US" baseline="0" dirty="0" smtClean="0"/>
-              <a:t>?</a:t>
-            </a:r>
-          </a:p>
-          <a:p>
-            <a:pPr marL="228600" indent="-228600">
-              <a:buFont typeface="+mj-lt"/>
-              <a:buNone/>
-            </a:pPr>
+              <a:t>Some developers think this is the way the whole web works</a:t>
+            </a:r>
+          </a:p>
+          <a:p>
             <a:r>
               <a:rPr lang="en-US" baseline="0" dirty="0" smtClean="0"/>
-              <a:t>Page Lifecycle brings state to the web, not totally a bad thing, but we all know the web is stateless</a:t>
-            </a:r>
-          </a:p>
-          <a:p>
-            <a:r>
-              <a:rPr lang="en-US" baseline="0" dirty="0" err="1" smtClean="0"/>
-              <a:t>Runat</a:t>
+              <a:t>Introduced page event </a:t>
             </a:r>
             <a:r>
               <a:rPr lang="en-US" baseline="0" dirty="0" smtClean="0"/>
-              <a:t>=server</a:t>
-            </a:r>
-          </a:p>
-          <a:p>
-            <a:r>
-              <a:rPr lang="en-US" baseline="0" dirty="0" smtClean="0"/>
-              <a:t>AJAX comes along, more client interaction</a:t>
-            </a:r>
-          </a:p>
-          <a:p>
-            <a:r>
-              <a:rPr lang="en-US" baseline="0" dirty="0" smtClean="0"/>
-              <a:t>Naming Container in </a:t>
-            </a:r>
-            <a:r>
-              <a:rPr lang="en-US" baseline="0" dirty="0" err="1" smtClean="0"/>
-              <a:t>javascript</a:t>
-            </a:r>
-            <a:r>
-              <a:rPr lang="en-US" baseline="0" dirty="0" smtClean="0"/>
-              <a:t> &lt;% %&gt; all over the place</a:t>
-            </a:r>
-          </a:p>
-          <a:p>
-            <a:r>
-              <a:rPr lang="en-US" baseline="0" dirty="0" smtClean="0"/>
-              <a:t>Atlas adds update panel, whole new set of problems</a:t>
-            </a:r>
-          </a:p>
-          <a:p>
+              <a:t>model (Lead in to event model)</a:t>
+            </a:r>
             <a:endParaRPr lang="en-US" dirty="0"/>
           </a:p>
         </p:txBody>
@@ -3007,7 +3445,7 @@
             <a:fld id="{F8007F4E-10F5-4104-9EF8-E98D370060A3}" type="slidenum">
               <a:rPr lang="en-US" smtClean="0"/>
               <a:pPr/>
-              <a:t>6</a:t>
+              <a:t>5</a:t>
             </a:fld>
             <a:endParaRPr lang="en-US"/>
           </a:p>
@@ -3069,96 +3507,44 @@
           <a:p>
             <a:r>
               <a:rPr lang="en-US" dirty="0" smtClean="0"/>
-              <a:t>The spaghetti</a:t>
+              <a:t>STEVE</a:t>
+            </a:r>
+          </a:p>
+          <a:p>
+            <a:r>
+              <a:rPr lang="en-US" dirty="0" smtClean="0"/>
+              <a:t>Who</a:t>
             </a:r>
             <a:r>
               <a:rPr lang="en-US" baseline="0" dirty="0" smtClean="0"/>
-              <a:t> of the </a:t>
+              <a:t> </a:t>
+            </a:r>
+            <a:r>
+              <a:rPr lang="en-US" baseline="0" dirty="0" smtClean="0"/>
+              <a:t>doesn’t love this?</a:t>
+            </a:r>
+          </a:p>
+          <a:p>
+            <a:r>
+              <a:rPr lang="en-US" baseline="0" dirty="0" smtClean="0"/>
+              <a:t>Was that </a:t>
             </a:r>
             <a:r>
               <a:rPr lang="en-US" baseline="0" dirty="0" err="1" smtClean="0"/>
-              <a:t>page_load</a:t>
+              <a:t>OnPreInit</a:t>
             </a:r>
             <a:r>
               <a:rPr lang="en-US" baseline="0" dirty="0" smtClean="0"/>
-              <a:t>. (</a:t>
-            </a:r>
-            <a:r>
-              <a:rPr lang="en-US" dirty="0" smtClean="0"/>
-              <a:t>A steaming pile of </a:t>
-            </a:r>
-            <a:r>
-              <a:rPr lang="en-US" dirty="0" err="1" smtClean="0"/>
-              <a:t>Page_Load</a:t>
-            </a:r>
-            <a:r>
-              <a:rPr lang="en-US" dirty="0" smtClean="0"/>
-              <a:t>)</a:t>
-            </a:r>
-          </a:p>
-          <a:p>
-            <a:r>
-              <a:rPr lang="en-US" dirty="0" smtClean="0"/>
-              <a:t>Neal</a:t>
+              <a:t> or </a:t>
+            </a:r>
+            <a:r>
+              <a:rPr lang="en-US" baseline="0" dirty="0" err="1" smtClean="0"/>
+              <a:t>OnPreLoad</a:t>
             </a:r>
             <a:r>
               <a:rPr lang="en-US" baseline="0" dirty="0" smtClean="0"/>
-              <a:t> Ford: “Bad developer will move heaven and Earth to do the wrong thing.”</a:t>
-            </a:r>
-          </a:p>
-          <a:p>
-            <a:r>
-              <a:rPr lang="en-US" baseline="0" dirty="0" smtClean="0"/>
-              <a:t>Mix of presentation and logic in the code behind, no Separation of Concerns</a:t>
-            </a:r>
-          </a:p>
-          <a:p>
-            <a:r>
-              <a:rPr lang="en-US" baseline="0" dirty="0" smtClean="0"/>
-              <a:t>Extremely difficult to test code behinds</a:t>
-            </a:r>
-          </a:p>
-          <a:p>
-            <a:pPr marL="228600" indent="-228600">
-              <a:buFont typeface="+mj-lt"/>
-              <a:buAutoNum type="arabicPeriod"/>
-            </a:pPr>
-            <a:r>
-              <a:rPr lang="en-US" baseline="0" dirty="0" smtClean="0"/>
-              <a:t>Dependent on web server to run</a:t>
-            </a:r>
-          </a:p>
-          <a:p>
-            <a:pPr marL="228600" indent="-228600">
-              <a:buFont typeface="+mj-lt"/>
-              <a:buAutoNum type="arabicPeriod"/>
-            </a:pPr>
-            <a:r>
-              <a:rPr lang="en-US" baseline="0" dirty="0" smtClean="0"/>
-              <a:t>Concrete classes on the web server run </a:t>
-            </a:r>
-            <a:r>
-              <a:rPr lang="en-US" baseline="0" dirty="0" err="1" smtClean="0"/>
-              <a:t>WebForms</a:t>
-            </a:r>
-            <a:endParaRPr lang="en-US" baseline="0" dirty="0" smtClean="0"/>
-          </a:p>
-          <a:p>
-            <a:pPr marL="228600" indent="-228600">
-              <a:buFont typeface="+mj-lt"/>
-              <a:buAutoNum type="arabicPeriod"/>
-            </a:pPr>
-            <a:r>
-              <a:rPr lang="en-US" baseline="0" dirty="0" smtClean="0"/>
-              <a:t>No way to fake or mock those classes</a:t>
-            </a:r>
-          </a:p>
-          <a:p>
-            <a:pPr marL="228600" indent="-228600">
-              <a:buFont typeface="+mj-lt"/>
-              <a:buAutoNum type="arabicPeriod"/>
-            </a:pPr>
-            <a:endParaRPr lang="en-US" baseline="0" dirty="0" smtClean="0"/>
+              <a:t>?</a:t>
+            </a:r>
           </a:p>
           <a:p>
             <a:pPr marL="228600" indent="-228600">
@@ -3167,8 +3553,47 @@
             </a:pPr>
             <a:r>
               <a:rPr lang="en-US" baseline="0" dirty="0" smtClean="0"/>
-              <a:t>Speaking Point: “So</a:t>
-            </a:r>
+              <a:t>Page Lifecycle brings state to the web, not totally a bad thing, but we all know the web is stateless</a:t>
+            </a:r>
+          </a:p>
+          <a:p>
+            <a:r>
+              <a:rPr lang="en-US" baseline="0" dirty="0" err="1" smtClean="0"/>
+              <a:t>Runat</a:t>
+            </a:r>
+            <a:r>
+              <a:rPr lang="en-US" baseline="0" dirty="0" smtClean="0"/>
+              <a:t>=server</a:t>
+            </a:r>
+          </a:p>
+          <a:p>
+            <a:r>
+              <a:rPr lang="en-US" baseline="0" dirty="0" smtClean="0"/>
+              <a:t>AJAX comes along, more client interaction</a:t>
+            </a:r>
+          </a:p>
+          <a:p>
+            <a:r>
+              <a:rPr lang="en-US" baseline="0" dirty="0" smtClean="0"/>
+              <a:t>Naming Container in </a:t>
+            </a:r>
+            <a:r>
+              <a:rPr lang="en-US" baseline="0" dirty="0" err="1" smtClean="0"/>
+              <a:t>javascript</a:t>
+            </a:r>
+            <a:r>
+              <a:rPr lang="en-US" baseline="0" dirty="0" smtClean="0"/>
+              <a:t> &lt;% %&gt; all over the place</a:t>
+            </a:r>
+          </a:p>
+          <a:p>
+            <a:r>
+              <a:rPr lang="en-US" baseline="0" dirty="0" smtClean="0"/>
+              <a:t>Atlas adds update panel, whole new set of problems</a:t>
+            </a:r>
+          </a:p>
+          <a:p>
+            <a:endParaRPr lang="en-US" dirty="0"/>
           </a:p>
         </p:txBody>
       </p:sp>
@@ -3190,7 +3615,7 @@
             <a:fld id="{F8007F4E-10F5-4104-9EF8-E98D370060A3}" type="slidenum">
               <a:rPr lang="en-US" smtClean="0"/>
               <a:pPr/>
-              <a:t>7</a:t>
+              <a:t>6</a:t>
             </a:fld>
             <a:endParaRPr lang="en-US"/>
           </a:p>
@@ -3250,39 +3675,121 @@
           </a:bodyPr>
           <a:lstStyle/>
           <a:p>
-            <a:pPr marL="0" marR="0" indent="0" algn="l" defTabSz="914400" rtl="0" eaLnBrk="1" fontAlgn="auto" latinLnBrk="0" hangingPunct="1">
-              <a:lnSpc>
-                <a:spcPct val="100000"/>
-              </a:lnSpc>
-              <a:spcBef>
-                <a:spcPts val="0"/>
-              </a:spcBef>
-              <a:spcAft>
-                <a:spcPts val="0"/>
-              </a:spcAft>
-              <a:buClrTx/>
-              <a:buSzTx/>
-              <a:buFontTx/>
+            <a:r>
+              <a:rPr lang="en-US" dirty="0" smtClean="0"/>
+              <a:t>TIM</a:t>
+            </a:r>
+          </a:p>
+          <a:p>
+            <a:endParaRPr lang="en-US" dirty="0" smtClean="0"/>
+          </a:p>
+          <a:p>
+            <a:r>
+              <a:rPr lang="en-US" dirty="0" smtClean="0"/>
+              <a:t>The </a:t>
+            </a:r>
+            <a:r>
+              <a:rPr lang="en-US" dirty="0" smtClean="0"/>
+              <a:t>spaghetti</a:t>
+            </a:r>
+            <a:r>
+              <a:rPr lang="en-US" baseline="0" dirty="0" smtClean="0"/>
+              <a:t> of the </a:t>
+            </a:r>
+            <a:r>
+              <a:rPr lang="en-US" baseline="0" dirty="0" err="1" smtClean="0"/>
+              <a:t>page_load</a:t>
+            </a:r>
+            <a:r>
+              <a:rPr lang="en-US" baseline="0" dirty="0" smtClean="0"/>
+              <a:t>. (</a:t>
+            </a:r>
+            <a:r>
+              <a:rPr lang="en-US" dirty="0" smtClean="0"/>
+              <a:t>A steaming pile of </a:t>
+            </a:r>
+            <a:r>
+              <a:rPr lang="en-US" dirty="0" err="1" smtClean="0"/>
+              <a:t>Page_Load</a:t>
+            </a:r>
+            <a:r>
+              <a:rPr lang="en-US" dirty="0" smtClean="0"/>
+              <a:t>)</a:t>
+            </a:r>
+          </a:p>
+          <a:p>
+            <a:r>
+              <a:rPr lang="en-US" dirty="0" smtClean="0"/>
+              <a:t>Neal</a:t>
+            </a:r>
+            <a:r>
+              <a:rPr lang="en-US" baseline="0" dirty="0" smtClean="0"/>
+              <a:t> Ford: “Bad developer will move heaven and Earth to do the wrong thing.”</a:t>
+            </a:r>
+          </a:p>
+          <a:p>
+            <a:r>
+              <a:rPr lang="en-US" baseline="0" dirty="0" smtClean="0"/>
+              <a:t>Mix of presentation and logic in the code behind, no Separation of Concerns</a:t>
+            </a:r>
+          </a:p>
+          <a:p>
+            <a:r>
+              <a:rPr lang="en-US" baseline="0" dirty="0" smtClean="0"/>
+              <a:t>Extremely difficult to test code behinds</a:t>
+            </a:r>
+          </a:p>
+          <a:p>
+            <a:pPr marL="228600" indent="-228600">
+              <a:buFont typeface="+mj-lt"/>
+              <a:buAutoNum type="arabicPeriod"/>
+            </a:pPr>
+            <a:r>
+              <a:rPr lang="en-US" baseline="0" dirty="0" smtClean="0"/>
+              <a:t>Dependent on web server to run</a:t>
+            </a:r>
+          </a:p>
+          <a:p>
+            <a:pPr marL="228600" indent="-228600">
+              <a:buFont typeface="+mj-lt"/>
+              <a:buAutoNum type="arabicPeriod"/>
+            </a:pPr>
+            <a:r>
+              <a:rPr lang="en-US" baseline="0" dirty="0" smtClean="0"/>
+              <a:t>Concrete classes on the web server run </a:t>
+            </a:r>
+            <a:r>
+              <a:rPr lang="en-US" baseline="0" dirty="0" err="1" smtClean="0"/>
+              <a:t>WebForms</a:t>
+            </a:r>
+            <a:endParaRPr lang="en-US" baseline="0" dirty="0" smtClean="0"/>
+          </a:p>
+          <a:p>
+            <a:pPr marL="228600" indent="-228600">
+              <a:buFont typeface="+mj-lt"/>
+              <a:buAutoNum type="arabicPeriod"/>
+            </a:pPr>
+            <a:r>
+              <a:rPr lang="en-US" baseline="0" dirty="0" smtClean="0"/>
+              <a:t>No way to fake or mock those classes</a:t>
+            </a:r>
+          </a:p>
+          <a:p>
+            <a:pPr marL="228600" indent="-228600">
+              <a:buFont typeface="+mj-lt"/>
+              <a:buAutoNum type="arabicPeriod"/>
+            </a:pPr>
+            <a:endParaRPr lang="en-US" baseline="0" dirty="0" smtClean="0"/>
+          </a:p>
+          <a:p>
+            <a:pPr marL="228600" indent="-228600">
+              <a:buFont typeface="+mj-lt"/>
               <a:buNone/>
-              <a:tabLst/>
-              <a:defRPr/>
             </a:pPr>
             <a:r>
               <a:rPr lang="en-US" baseline="0" dirty="0" smtClean="0"/>
-              <a:t>Demand from community for an offering from Microsoft</a:t>
-            </a:r>
-            <a:endParaRPr lang="en-US" dirty="0" smtClean="0"/>
-          </a:p>
-          <a:p>
-            <a:r>
-              <a:rPr lang="en-US" dirty="0" smtClean="0"/>
-              <a:t>Explain why monorail</a:t>
-            </a:r>
-            <a:r>
-              <a:rPr lang="en-US" baseline="0" dirty="0" smtClean="0"/>
-              <a:t> is a valid alternative, but it’s Open Source</a:t>
-            </a:r>
-            <a:endParaRPr lang="en-US" dirty="0"/>
+              <a:t>Speaking Point: “So</a:t>
+            </a:r>
           </a:p>
         </p:txBody>
       </p:sp>
@@ -3304,7 +3811,7 @@
             <a:fld id="{F8007F4E-10F5-4104-9EF8-E98D370060A3}" type="slidenum">
               <a:rPr lang="en-US" smtClean="0"/>
               <a:pPr/>
-              <a:t>8</a:t>
+              <a:t>7</a:t>
             </a:fld>
             <a:endParaRPr lang="en-US"/>
           </a:p>
@@ -3364,17 +3871,89 @@
           </a:bodyPr>
           <a:lstStyle/>
           <a:p>
+            <a:pPr marL="0" marR="0" indent="0" algn="l" defTabSz="914400" rtl="0" eaLnBrk="1" fontAlgn="auto" latinLnBrk="0" hangingPunct="1">
+              <a:lnSpc>
+                <a:spcPct val="100000"/>
+              </a:lnSpc>
+              <a:spcBef>
+                <a:spcPts val="0"/>
+              </a:spcBef>
+              <a:spcAft>
+                <a:spcPts val="0"/>
+              </a:spcAft>
+              <a:buClrTx/>
+              <a:buSzTx/>
+              <a:buFontTx/>
+              <a:buNone/>
+              <a:tabLst/>
+              <a:defRPr/>
+            </a:pPr>
+            <a:r>
+              <a:rPr lang="en-US" baseline="0" dirty="0" smtClean="0"/>
+              <a:t>STEVE</a:t>
+            </a:r>
+          </a:p>
+          <a:p>
+            <a:pPr marL="0" marR="0" indent="0" algn="l" defTabSz="914400" rtl="0" eaLnBrk="1" fontAlgn="auto" latinLnBrk="0" hangingPunct="1">
+              <a:lnSpc>
+                <a:spcPct val="100000"/>
+              </a:lnSpc>
+              <a:spcBef>
+                <a:spcPts val="0"/>
+              </a:spcBef>
+              <a:spcAft>
+                <a:spcPts val="0"/>
+              </a:spcAft>
+              <a:buClrTx/>
+              <a:buSzTx/>
+              <a:buFontTx/>
+              <a:buNone/>
+              <a:tabLst/>
+              <a:defRPr/>
+            </a:pPr>
+            <a:endParaRPr lang="en-US" baseline="0" dirty="0" smtClean="0"/>
+          </a:p>
+          <a:p>
+            <a:pPr marL="0" marR="0" indent="0" algn="l" defTabSz="914400" rtl="0" eaLnBrk="1" fontAlgn="auto" latinLnBrk="0" hangingPunct="1">
+              <a:lnSpc>
+                <a:spcPct val="100000"/>
+              </a:lnSpc>
+              <a:spcBef>
+                <a:spcPts val="0"/>
+              </a:spcBef>
+              <a:spcAft>
+                <a:spcPts val="0"/>
+              </a:spcAft>
+              <a:buClrTx/>
+              <a:buSzTx/>
+              <a:buFontTx/>
+              <a:buNone/>
+              <a:tabLst/>
+              <a:defRPr/>
+            </a:pPr>
+            <a:r>
+              <a:rPr lang="en-US" baseline="0" dirty="0" smtClean="0"/>
+              <a:t>Demand </a:t>
+            </a:r>
+            <a:r>
+              <a:rPr lang="en-US" baseline="0" dirty="0" smtClean="0"/>
+              <a:t>from community for an offering from Microsoft</a:t>
+            </a:r>
+            <a:endParaRPr lang="en-US" dirty="0" smtClean="0"/>
+          </a:p>
+          <a:p>
             <a:r>
               <a:rPr lang="en-US" dirty="0" smtClean="0"/>
-              <a:t>PHP lists 35 different MVC implementations</a:t>
+              <a:t>Explain why monorail</a:t>
             </a:r>
             <a:r>
               <a:rPr lang="en-US" baseline="0" dirty="0" smtClean="0"/>
-              <a:t> on Wikipedia</a:t>
-            </a:r>
-            <a:endParaRPr lang="en-US" dirty="0" smtClean="0"/>
-          </a:p>
-          <a:p>
+              <a:t> is a valid alternative, but it’s Open </a:t>
+            </a:r>
+            <a:r>
+              <a:rPr lang="en-US" baseline="0" dirty="0" smtClean="0"/>
+              <a:t>Source (Not from Microsoft)</a:t>
+            </a:r>
             <a:endParaRPr lang="en-US" dirty="0"/>
           </a:p>
         </p:txBody>
@@ -3397,7 +3976,7 @@
             <a:fld id="{F8007F4E-10F5-4104-9EF8-E98D370060A3}" type="slidenum">
               <a:rPr lang="en-US" smtClean="0"/>
               <a:pPr/>
-              <a:t>10</a:t>
+              <a:t>8</a:t>
             </a:fld>
             <a:endParaRPr lang="en-US"/>
           </a:p>
@@ -3459,7 +4038,7 @@
           <a:p>
             <a:r>
               <a:rPr lang="en-US" dirty="0" smtClean="0"/>
-              <a:t>Spring MVC, specifically</a:t>
+              <a:t>TIM</a:t>
             </a:r>
             <a:endParaRPr lang="en-US" dirty="0"/>
           </a:p>
@@ -3483,7 +4062,7 @@
             <a:fld id="{F8007F4E-10F5-4104-9EF8-E98D370060A3}" type="slidenum">
               <a:rPr lang="en-US" smtClean="0"/>
               <a:pPr/>
-              <a:t>11</a:t>
+              <a:t>9</a:t>
             </a:fld>
             <a:endParaRPr lang="en-US"/>
           </a:p>
@@ -3534,7 +4113,7 @@
             <a:fld id="{1D8BD707-D9CF-40AE-B4C6-C98DA3205C09}" type="datetimeFigureOut">
               <a:rPr lang="en-US" smtClean="0"/>
               <a:pPr/>
-              <a:t>10/9/2009</a:t>
+              <a:t>10/15/2009</a:t>
             </a:fld>
             <a:endParaRPr lang="en-US"/>
           </a:p>
@@ -4005,7 +4584,7 @@
             <a:fld id="{1D8BD707-D9CF-40AE-B4C6-C98DA3205C09}" type="datetimeFigureOut">
               <a:rPr lang="en-US" smtClean="0"/>
               <a:pPr/>
-              <a:t>10/9/2009</a:t>
+              <a:t>10/15/2009</a:t>
             </a:fld>
             <a:endParaRPr lang="en-US"/>
           </a:p>
@@ -4192,7 +4771,7 @@
             <a:fld id="{1D8BD707-D9CF-40AE-B4C6-C98DA3205C09}" type="datetimeFigureOut">
               <a:rPr lang="en-US" smtClean="0"/>
               <a:pPr/>
-              <a:t>10/9/2009</a:t>
+              <a:t>10/15/2009</a:t>
             </a:fld>
             <a:endParaRPr lang="en-US"/>
           </a:p>
@@ -4369,7 +4948,7 @@
             <a:fld id="{1D8BD707-D9CF-40AE-B4C6-C98DA3205C09}" type="datetimeFigureOut">
               <a:rPr lang="en-US" smtClean="0"/>
               <a:pPr/>
-              <a:t>10/9/2009</a:t>
+              <a:t>10/15/2009</a:t>
             </a:fld>
             <a:endParaRPr lang="en-US"/>
           </a:p>
@@ -5854,7 +6433,7 @@
             <a:fld id="{1D8BD707-D9CF-40AE-B4C6-C98DA3205C09}" type="datetimeFigureOut">
               <a:rPr lang="en-US" smtClean="0"/>
               <a:pPr/>
-              <a:t>10/9/2009</a:t>
+              <a:t>10/15/2009</a:t>
             </a:fld>
             <a:endParaRPr lang="en-US"/>
           </a:p>
@@ -6456,7 +7035,7 @@
             <a:fld id="{1D8BD707-D9CF-40AE-B4C6-C98DA3205C09}" type="datetimeFigureOut">
               <a:rPr lang="en-US" smtClean="0"/>
               <a:pPr/>
-              <a:t>10/9/2009</a:t>
+              <a:t>10/15/2009</a:t>
             </a:fld>
             <a:endParaRPr lang="en-US"/>
           </a:p>
@@ -6895,7 +7474,7 @@
             <a:fld id="{1D8BD707-D9CF-40AE-B4C6-C98DA3205C09}" type="datetimeFigureOut">
               <a:rPr lang="en-US" smtClean="0"/>
               <a:pPr/>
-              <a:t>10/9/2009</a:t>
+              <a:t>10/15/2009</a:t>
             </a:fld>
             <a:endParaRPr lang="en-US"/>
           </a:p>
@@ -7458,7 +8037,7 @@
             <a:fld id="{1D8BD707-D9CF-40AE-B4C6-C98DA3205C09}" type="datetimeFigureOut">
               <a:rPr lang="en-US" smtClean="0"/>
               <a:pPr/>
-              <a:t>10/9/2009</a:t>
+              <a:t>10/15/2009</a:t>
             </a:fld>
             <a:endParaRPr lang="en-US"/>
           </a:p>
@@ -7556,7 +8135,7 @@
             <a:fld id="{1D8BD707-D9CF-40AE-B4C6-C98DA3205C09}" type="datetimeFigureOut">
               <a:rPr lang="en-US" smtClean="0"/>
               <a:pPr/>
-              <a:t>10/9/2009</a:t>
+              <a:t>10/15/2009</a:t>
             </a:fld>
             <a:endParaRPr lang="en-US"/>
           </a:p>
@@ -7812,7 +8391,7 @@
             <a:fld id="{1D8BD707-D9CF-40AE-B4C6-C98DA3205C09}" type="datetimeFigureOut">
               <a:rPr lang="en-US" smtClean="0"/>
               <a:pPr/>
-              <a:t>10/9/2009</a:t>
+              <a:t>10/15/2009</a:t>
             </a:fld>
             <a:endParaRPr lang="en-US"/>
           </a:p>
@@ -8535,7 +9114,7 @@
             <a:fld id="{1D8BD707-D9CF-40AE-B4C6-C98DA3205C09}" type="datetimeFigureOut">
               <a:rPr lang="en-US" smtClean="0"/>
               <a:pPr/>
-              <a:t>10/9/2009</a:t>
+              <a:t>10/15/2009</a:t>
             </a:fld>
             <a:endParaRPr lang="en-US"/>
           </a:p>
@@ -8962,7 +9541,7 @@
             <a:fld id="{1D8BD707-D9CF-40AE-B4C6-C98DA3205C09}" type="datetimeFigureOut">
               <a:rPr lang="en-US" smtClean="0"/>
               <a:pPr/>
-              <a:t>10/9/2009</a:t>
+              <a:t>10/15/2009</a:t>
             </a:fld>
             <a:endParaRPr lang="en-US"/>
           </a:p>
@@ -9685,7 +10264,7 @@
           <p:nvPr/>
         </p:nvPicPr>
         <p:blipFill>
-          <a:blip r:embed="rId2" cstate="print"/>
+          <a:blip r:embed="rId3" cstate="print"/>
           <a:srcRect/>
           <a:stretch>
             <a:fillRect/>
@@ -9711,7 +10290,7 @@
           <p:nvPr/>
         </p:nvPicPr>
         <p:blipFill>
-          <a:blip r:embed="rId3"/>
+          <a:blip r:embed="rId4"/>
           <a:srcRect/>
           <a:stretch>
             <a:fillRect/>
@@ -11691,7 +12270,7 @@
           <p:nvPr/>
         </p:nvPicPr>
         <p:blipFill>
-          <a:blip r:embed="rId2"/>
+          <a:blip r:embed="rId3"/>
           <a:srcRect/>
           <a:stretch>
             <a:fillRect/>
@@ -11717,7 +12296,7 @@
           <p:nvPr/>
         </p:nvPicPr>
         <p:blipFill>
-          <a:blip r:embed="rId3"/>
+          <a:blip r:embed="rId4"/>
           <a:srcRect/>
           <a:stretch>
             <a:fillRect/>
@@ -12437,7 +13016,7 @@
           <p:nvPr/>
         </p:nvPicPr>
         <p:blipFill>
-          <a:blip r:embed="rId2"/>
+          <a:blip r:embed="rId3"/>
           <a:srcRect/>
           <a:stretch>
             <a:fillRect/>
@@ -12463,7 +13042,7 @@
           <p:nvPr/>
         </p:nvPicPr>
         <p:blipFill>
-          <a:blip r:embed="rId3"/>
+          <a:blip r:embed="rId4"/>
           <a:srcRect/>
           <a:stretch>
             <a:fillRect/>
@@ -12489,7 +13068,7 @@
           <p:nvPr/>
         </p:nvPicPr>
         <p:blipFill>
-          <a:blip r:embed="rId4"/>
+          <a:blip r:embed="rId5"/>
           <a:srcRect/>
           <a:stretch>
             <a:fillRect/>

</xml_diff>